<commit_message>
add Fi6-2 TLS recorodo and message size
</commit_message>
<xml_diff>
--- a/Part2.Programming/Chapter6.TLSProtocol/Chapter6.Fig.pptx
+++ b/Part2.Programming/Chapter6.TLSProtocol/Chapter6.Fig.pptx
@@ -4,8 +4,12 @@
   <p:sldMasterIdLst>
     <p:sldMasterId id="2147483648" r:id="rId1"/>
   </p:sldMasterIdLst>
+  <p:notesMasterIdLst>
+    <p:notesMasterId r:id="rId4"/>
+  </p:notesMasterIdLst>
   <p:sldIdLst>
     <p:sldId id="256" r:id="rId2"/>
+    <p:sldId id="257" r:id="rId3"/>
   </p:sldIdLst>
   <p:sldSz cx="12192000" cy="6858000"/>
   <p:notesSz cx="6858000" cy="9144000"/>
@@ -104,7 +108,477 @@
       </a:defRPr>
     </a:lvl9pPr>
   </p:defaultTextStyle>
+  <p:extLst>
+    <p:ext uri="{EFAFB233-063F-42B5-8137-9DF3F51BA10A}">
+      <p15:sldGuideLst xmlns:p15="http://schemas.microsoft.com/office/powerpoint/2012/main"/>
+    </p:ext>
+  </p:extLst>
 </p:presentation>
+</file>
+
+<file path=ppt/notesMasters/notesMaster1.xml><?xml version="1.0" encoding="utf-8"?>
+<p:notesMaster xmlns:a="http://schemas.openxmlformats.org/drawingml/2006/main" xmlns:r="http://schemas.openxmlformats.org/officeDocument/2006/relationships" xmlns:p="http://schemas.openxmlformats.org/presentationml/2006/main">
+  <p:cSld>
+    <p:bg>
+      <p:bgRef idx="1001">
+        <a:schemeClr val="bg1"/>
+      </p:bgRef>
+    </p:bg>
+    <p:spTree>
+      <p:nvGrpSpPr>
+        <p:cNvPr id="1" name=""/>
+        <p:cNvGrpSpPr/>
+        <p:nvPr/>
+      </p:nvGrpSpPr>
+      <p:grpSpPr>
+        <a:xfrm>
+          <a:off x="0" y="0"/>
+          <a:ext cx="0" cy="0"/>
+          <a:chOff x="0" y="0"/>
+          <a:chExt cx="0" cy="0"/>
+        </a:xfrm>
+      </p:grpSpPr>
+      <p:sp>
+        <p:nvSpPr>
+          <p:cNvPr id="2" name="ヘッダー プレースホルダー 1"/>
+          <p:cNvSpPr>
+            <a:spLocks noGrp="1"/>
+          </p:cNvSpPr>
+          <p:nvPr>
+            <p:ph type="hdr" sz="quarter"/>
+          </p:nvPr>
+        </p:nvSpPr>
+        <p:spPr>
+          <a:xfrm>
+            <a:off x="0" y="0"/>
+            <a:ext cx="2971800" cy="458788"/>
+          </a:xfrm>
+          <a:prstGeom prst="rect">
+            <a:avLst/>
+          </a:prstGeom>
+        </p:spPr>
+        <p:txBody>
+          <a:bodyPr vert="horz" lIns="91440" tIns="45720" rIns="91440" bIns="45720" rtlCol="0"/>
+          <a:lstStyle>
+            <a:lvl1pPr algn="l">
+              <a:defRPr sz="1200"/>
+            </a:lvl1pPr>
+          </a:lstStyle>
+          <a:p>
+            <a:endParaRPr kumimoji="1" lang="ja-JP" altLang="en-US"/>
+          </a:p>
+        </p:txBody>
+      </p:sp>
+      <p:sp>
+        <p:nvSpPr>
+          <p:cNvPr id="3" name="日付プレースホルダー 2"/>
+          <p:cNvSpPr>
+            <a:spLocks noGrp="1"/>
+          </p:cNvSpPr>
+          <p:nvPr>
+            <p:ph type="dt" idx="1"/>
+          </p:nvPr>
+        </p:nvSpPr>
+        <p:spPr>
+          <a:xfrm>
+            <a:off x="3884613" y="0"/>
+            <a:ext cx="2971800" cy="458788"/>
+          </a:xfrm>
+          <a:prstGeom prst="rect">
+            <a:avLst/>
+          </a:prstGeom>
+        </p:spPr>
+        <p:txBody>
+          <a:bodyPr vert="horz" lIns="91440" tIns="45720" rIns="91440" bIns="45720" rtlCol="0"/>
+          <a:lstStyle>
+            <a:lvl1pPr algn="r">
+              <a:defRPr sz="1200"/>
+            </a:lvl1pPr>
+          </a:lstStyle>
+          <a:p>
+            <a:fld id="{CA970258-1A10-C646-8FB8-BF2FF6412671}" type="datetimeFigureOut">
+              <a:rPr kumimoji="1" lang="ja-JP" altLang="en-US" smtClean="0"/>
+              <a:t>2021/7/9</a:t>
+            </a:fld>
+            <a:endParaRPr kumimoji="1" lang="ja-JP" altLang="en-US"/>
+          </a:p>
+        </p:txBody>
+      </p:sp>
+      <p:sp>
+        <p:nvSpPr>
+          <p:cNvPr id="4" name="スライド イメージ プレースホルダー 3"/>
+          <p:cNvSpPr>
+            <a:spLocks noGrp="1" noRot="1" noChangeAspect="1"/>
+          </p:cNvSpPr>
+          <p:nvPr>
+            <p:ph type="sldImg" idx="2"/>
+          </p:nvPr>
+        </p:nvSpPr>
+        <p:spPr>
+          <a:xfrm>
+            <a:off x="685800" y="1143000"/>
+            <a:ext cx="5486400" cy="3086100"/>
+          </a:xfrm>
+          <a:prstGeom prst="rect">
+            <a:avLst/>
+          </a:prstGeom>
+          <a:noFill/>
+          <a:ln w="12700">
+            <a:solidFill>
+              <a:prstClr val="black"/>
+            </a:solidFill>
+          </a:ln>
+        </p:spPr>
+        <p:txBody>
+          <a:bodyPr vert="horz" lIns="91440" tIns="45720" rIns="91440" bIns="45720" rtlCol="0" anchor="ctr"/>
+          <a:lstStyle/>
+          <a:p>
+            <a:endParaRPr lang="ja-JP" altLang="en-US"/>
+          </a:p>
+        </p:txBody>
+      </p:sp>
+      <p:sp>
+        <p:nvSpPr>
+          <p:cNvPr id="5" name="ノート プレースホルダー 4"/>
+          <p:cNvSpPr>
+            <a:spLocks noGrp="1"/>
+          </p:cNvSpPr>
+          <p:nvPr>
+            <p:ph type="body" sz="quarter" idx="3"/>
+          </p:nvPr>
+        </p:nvSpPr>
+        <p:spPr>
+          <a:xfrm>
+            <a:off x="685800" y="4400550"/>
+            <a:ext cx="5486400" cy="3600450"/>
+          </a:xfrm>
+          <a:prstGeom prst="rect">
+            <a:avLst/>
+          </a:prstGeom>
+        </p:spPr>
+        <p:txBody>
+          <a:bodyPr vert="horz" lIns="91440" tIns="45720" rIns="91440" bIns="45720" rtlCol="0"/>
+          <a:lstStyle/>
+          <a:p>
+            <a:pPr lvl="0"/>
+            <a:r>
+              <a:rPr kumimoji="1" lang="ja-JP" altLang="en-US"/>
+              <a:t>マスター テキストの書式設定</a:t>
+            </a:r>
+          </a:p>
+          <a:p>
+            <a:pPr lvl="1"/>
+            <a:r>
+              <a:rPr kumimoji="1" lang="ja-JP" altLang="en-US"/>
+              <a:t>第 </a:t>
+            </a:r>
+            <a:r>
+              <a:rPr kumimoji="1" lang="en-US" altLang="ja-JP"/>
+              <a:t>2 </a:t>
+            </a:r>
+            <a:r>
+              <a:rPr kumimoji="1" lang="ja-JP" altLang="en-US"/>
+              <a:t>レベル</a:t>
+            </a:r>
+          </a:p>
+          <a:p>
+            <a:pPr lvl="2"/>
+            <a:r>
+              <a:rPr kumimoji="1" lang="ja-JP" altLang="en-US"/>
+              <a:t>第 </a:t>
+            </a:r>
+            <a:r>
+              <a:rPr kumimoji="1" lang="en-US" altLang="ja-JP"/>
+              <a:t>3 </a:t>
+            </a:r>
+            <a:r>
+              <a:rPr kumimoji="1" lang="ja-JP" altLang="en-US"/>
+              <a:t>レベル</a:t>
+            </a:r>
+          </a:p>
+          <a:p>
+            <a:pPr lvl="3"/>
+            <a:r>
+              <a:rPr kumimoji="1" lang="ja-JP" altLang="en-US"/>
+              <a:t>第 </a:t>
+            </a:r>
+            <a:r>
+              <a:rPr kumimoji="1" lang="en-US" altLang="ja-JP"/>
+              <a:t>4 </a:t>
+            </a:r>
+            <a:r>
+              <a:rPr kumimoji="1" lang="ja-JP" altLang="en-US"/>
+              <a:t>レベル</a:t>
+            </a:r>
+          </a:p>
+          <a:p>
+            <a:pPr lvl="4"/>
+            <a:r>
+              <a:rPr kumimoji="1" lang="ja-JP" altLang="en-US"/>
+              <a:t>第 </a:t>
+            </a:r>
+            <a:r>
+              <a:rPr kumimoji="1" lang="en-US" altLang="ja-JP"/>
+              <a:t>5 </a:t>
+            </a:r>
+            <a:r>
+              <a:rPr kumimoji="1" lang="ja-JP" altLang="en-US"/>
+              <a:t>レベル</a:t>
+            </a:r>
+          </a:p>
+        </p:txBody>
+      </p:sp>
+      <p:sp>
+        <p:nvSpPr>
+          <p:cNvPr id="6" name="フッター プレースホルダー 5"/>
+          <p:cNvSpPr>
+            <a:spLocks noGrp="1"/>
+          </p:cNvSpPr>
+          <p:nvPr>
+            <p:ph type="ftr" sz="quarter" idx="4"/>
+          </p:nvPr>
+        </p:nvSpPr>
+        <p:spPr>
+          <a:xfrm>
+            <a:off x="0" y="8685213"/>
+            <a:ext cx="2971800" cy="458787"/>
+          </a:xfrm>
+          <a:prstGeom prst="rect">
+            <a:avLst/>
+          </a:prstGeom>
+        </p:spPr>
+        <p:txBody>
+          <a:bodyPr vert="horz" lIns="91440" tIns="45720" rIns="91440" bIns="45720" rtlCol="0" anchor="b"/>
+          <a:lstStyle>
+            <a:lvl1pPr algn="l">
+              <a:defRPr sz="1200"/>
+            </a:lvl1pPr>
+          </a:lstStyle>
+          <a:p>
+            <a:endParaRPr kumimoji="1" lang="ja-JP" altLang="en-US"/>
+          </a:p>
+        </p:txBody>
+      </p:sp>
+      <p:sp>
+        <p:nvSpPr>
+          <p:cNvPr id="7" name="スライド番号プレースホルダー 6"/>
+          <p:cNvSpPr>
+            <a:spLocks noGrp="1"/>
+          </p:cNvSpPr>
+          <p:nvPr>
+            <p:ph type="sldNum" sz="quarter" idx="5"/>
+          </p:nvPr>
+        </p:nvSpPr>
+        <p:spPr>
+          <a:xfrm>
+            <a:off x="3884613" y="8685213"/>
+            <a:ext cx="2971800" cy="458787"/>
+          </a:xfrm>
+          <a:prstGeom prst="rect">
+            <a:avLst/>
+          </a:prstGeom>
+        </p:spPr>
+        <p:txBody>
+          <a:bodyPr vert="horz" lIns="91440" tIns="45720" rIns="91440" bIns="45720" rtlCol="0" anchor="b"/>
+          <a:lstStyle>
+            <a:lvl1pPr algn="r">
+              <a:defRPr sz="1200"/>
+            </a:lvl1pPr>
+          </a:lstStyle>
+          <a:p>
+            <a:fld id="{E73035C4-D6BF-F142-86ED-84A3E046DE73}" type="slidenum">
+              <a:rPr kumimoji="1" lang="ja-JP" altLang="en-US" smtClean="0"/>
+              <a:t>‹#›</a:t>
+            </a:fld>
+            <a:endParaRPr kumimoji="1" lang="ja-JP" altLang="en-US"/>
+          </a:p>
+        </p:txBody>
+      </p:sp>
+    </p:spTree>
+    <p:extLst>
+      <p:ext uri="{BB962C8B-B14F-4D97-AF65-F5344CB8AC3E}">
+        <p14:creationId xmlns:p14="http://schemas.microsoft.com/office/powerpoint/2010/main" val="3600498967"/>
+      </p:ext>
+    </p:extLst>
+  </p:cSld>
+  <p:clrMap bg1="lt1" tx1="dk1" bg2="lt2" tx2="dk2" accent1="accent1" accent2="accent2" accent3="accent3" accent4="accent4" accent5="accent5" accent6="accent6" hlink="hlink" folHlink="folHlink"/>
+  <p:notesStyle>
+    <a:lvl1pPr marL="0" algn="l" defTabSz="914400" rtl="0" eaLnBrk="1" latinLnBrk="0" hangingPunct="1">
+      <a:defRPr kumimoji="1" sz="1200" kern="1200">
+        <a:solidFill>
+          <a:schemeClr val="tx1"/>
+        </a:solidFill>
+        <a:latin typeface="+mn-lt"/>
+        <a:ea typeface="+mn-ea"/>
+        <a:cs typeface="+mn-cs"/>
+      </a:defRPr>
+    </a:lvl1pPr>
+    <a:lvl2pPr marL="457200" algn="l" defTabSz="914400" rtl="0" eaLnBrk="1" latinLnBrk="0" hangingPunct="1">
+      <a:defRPr kumimoji="1" sz="1200" kern="1200">
+        <a:solidFill>
+          <a:schemeClr val="tx1"/>
+        </a:solidFill>
+        <a:latin typeface="+mn-lt"/>
+        <a:ea typeface="+mn-ea"/>
+        <a:cs typeface="+mn-cs"/>
+      </a:defRPr>
+    </a:lvl2pPr>
+    <a:lvl3pPr marL="914400" algn="l" defTabSz="914400" rtl="0" eaLnBrk="1" latinLnBrk="0" hangingPunct="1">
+      <a:defRPr kumimoji="1" sz="1200" kern="1200">
+        <a:solidFill>
+          <a:schemeClr val="tx1"/>
+        </a:solidFill>
+        <a:latin typeface="+mn-lt"/>
+        <a:ea typeface="+mn-ea"/>
+        <a:cs typeface="+mn-cs"/>
+      </a:defRPr>
+    </a:lvl3pPr>
+    <a:lvl4pPr marL="1371600" algn="l" defTabSz="914400" rtl="0" eaLnBrk="1" latinLnBrk="0" hangingPunct="1">
+      <a:defRPr kumimoji="1" sz="1200" kern="1200">
+        <a:solidFill>
+          <a:schemeClr val="tx1"/>
+        </a:solidFill>
+        <a:latin typeface="+mn-lt"/>
+        <a:ea typeface="+mn-ea"/>
+        <a:cs typeface="+mn-cs"/>
+      </a:defRPr>
+    </a:lvl4pPr>
+    <a:lvl5pPr marL="1828800" algn="l" defTabSz="914400" rtl="0" eaLnBrk="1" latinLnBrk="0" hangingPunct="1">
+      <a:defRPr kumimoji="1" sz="1200" kern="1200">
+        <a:solidFill>
+          <a:schemeClr val="tx1"/>
+        </a:solidFill>
+        <a:latin typeface="+mn-lt"/>
+        <a:ea typeface="+mn-ea"/>
+        <a:cs typeface="+mn-cs"/>
+      </a:defRPr>
+    </a:lvl5pPr>
+    <a:lvl6pPr marL="2286000" algn="l" defTabSz="914400" rtl="0" eaLnBrk="1" latinLnBrk="0" hangingPunct="1">
+      <a:defRPr kumimoji="1" sz="1200" kern="1200">
+        <a:solidFill>
+          <a:schemeClr val="tx1"/>
+        </a:solidFill>
+        <a:latin typeface="+mn-lt"/>
+        <a:ea typeface="+mn-ea"/>
+        <a:cs typeface="+mn-cs"/>
+      </a:defRPr>
+    </a:lvl6pPr>
+    <a:lvl7pPr marL="2743200" algn="l" defTabSz="914400" rtl="0" eaLnBrk="1" latinLnBrk="0" hangingPunct="1">
+      <a:defRPr kumimoji="1" sz="1200" kern="1200">
+        <a:solidFill>
+          <a:schemeClr val="tx1"/>
+        </a:solidFill>
+        <a:latin typeface="+mn-lt"/>
+        <a:ea typeface="+mn-ea"/>
+        <a:cs typeface="+mn-cs"/>
+      </a:defRPr>
+    </a:lvl7pPr>
+    <a:lvl8pPr marL="3200400" algn="l" defTabSz="914400" rtl="0" eaLnBrk="1" latinLnBrk="0" hangingPunct="1">
+      <a:defRPr kumimoji="1" sz="1200" kern="1200">
+        <a:solidFill>
+          <a:schemeClr val="tx1"/>
+        </a:solidFill>
+        <a:latin typeface="+mn-lt"/>
+        <a:ea typeface="+mn-ea"/>
+        <a:cs typeface="+mn-cs"/>
+      </a:defRPr>
+    </a:lvl8pPr>
+    <a:lvl9pPr marL="3657600" algn="l" defTabSz="914400" rtl="0" eaLnBrk="1" latinLnBrk="0" hangingPunct="1">
+      <a:defRPr kumimoji="1" sz="1200" kern="1200">
+        <a:solidFill>
+          <a:schemeClr val="tx1"/>
+        </a:solidFill>
+        <a:latin typeface="+mn-lt"/>
+        <a:ea typeface="+mn-ea"/>
+        <a:cs typeface="+mn-cs"/>
+      </a:defRPr>
+    </a:lvl9pPr>
+  </p:notesStyle>
+</p:notesMaster>
+</file>
+
+<file path=ppt/notesSlides/notesSlide1.xml><?xml version="1.0" encoding="utf-8"?>
+<p:notes xmlns:a="http://schemas.openxmlformats.org/drawingml/2006/main" xmlns:r="http://schemas.openxmlformats.org/officeDocument/2006/relationships" xmlns:p="http://schemas.openxmlformats.org/presentationml/2006/main">
+  <p:cSld>
+    <p:spTree>
+      <p:nvGrpSpPr>
+        <p:cNvPr id="1" name=""/>
+        <p:cNvGrpSpPr/>
+        <p:nvPr/>
+      </p:nvGrpSpPr>
+      <p:grpSpPr>
+        <a:xfrm>
+          <a:off x="0" y="0"/>
+          <a:ext cx="0" cy="0"/>
+          <a:chOff x="0" y="0"/>
+          <a:chExt cx="0" cy="0"/>
+        </a:xfrm>
+      </p:grpSpPr>
+      <p:sp>
+        <p:nvSpPr>
+          <p:cNvPr id="2" name="スライド イメージ プレースホルダー 1"/>
+          <p:cNvSpPr>
+            <a:spLocks noGrp="1" noRot="1" noChangeAspect="1"/>
+          </p:cNvSpPr>
+          <p:nvPr>
+            <p:ph type="sldImg"/>
+          </p:nvPr>
+        </p:nvSpPr>
+        <p:spPr/>
+      </p:sp>
+      <p:sp>
+        <p:nvSpPr>
+          <p:cNvPr id="3" name="ノート プレースホルダー 2"/>
+          <p:cNvSpPr>
+            <a:spLocks noGrp="1"/>
+          </p:cNvSpPr>
+          <p:nvPr>
+            <p:ph type="body" idx="1"/>
+          </p:nvPr>
+        </p:nvSpPr>
+        <p:spPr/>
+        <p:txBody>
+          <a:bodyPr/>
+          <a:lstStyle/>
+          <a:p>
+            <a:endParaRPr kumimoji="1" lang="ja-JP" altLang="en-US"/>
+          </a:p>
+        </p:txBody>
+      </p:sp>
+      <p:sp>
+        <p:nvSpPr>
+          <p:cNvPr id="4" name="スライド番号プレースホルダー 3"/>
+          <p:cNvSpPr>
+            <a:spLocks noGrp="1"/>
+          </p:cNvSpPr>
+          <p:nvPr>
+            <p:ph type="sldNum" sz="quarter" idx="5"/>
+          </p:nvPr>
+        </p:nvSpPr>
+        <p:spPr/>
+        <p:txBody>
+          <a:bodyPr/>
+          <a:lstStyle/>
+          <a:p>
+            <a:fld id="{E73035C4-D6BF-F142-86ED-84A3E046DE73}" type="slidenum">
+              <a:rPr kumimoji="1" lang="ja-JP" altLang="en-US" smtClean="0"/>
+              <a:t>2</a:t>
+            </a:fld>
+            <a:endParaRPr kumimoji="1" lang="ja-JP" altLang="en-US"/>
+          </a:p>
+        </p:txBody>
+      </p:sp>
+    </p:spTree>
+    <p:extLst>
+      <p:ext uri="{BB962C8B-B14F-4D97-AF65-F5344CB8AC3E}">
+        <p14:creationId xmlns:p14="http://schemas.microsoft.com/office/powerpoint/2010/main" val="2156853188"/>
+      </p:ext>
+    </p:extLst>
+  </p:cSld>
+  <p:clrMapOvr>
+    <a:masterClrMapping/>
+  </p:clrMapOvr>
+</p:notes>
 </file>
 
 <file path=ppt/slideLayouts/slideLayout1.xml><?xml version="1.0" encoding="utf-8"?>
@@ -4289,6 +4763,2244 @@
 </p:sld>
 </file>
 
+<file path=ppt/slides/slide2.xml><?xml version="1.0" encoding="utf-8"?>
+<p:sld xmlns:a="http://schemas.openxmlformats.org/drawingml/2006/main" xmlns:r="http://schemas.openxmlformats.org/officeDocument/2006/relationships" xmlns:p="http://schemas.openxmlformats.org/presentationml/2006/main">
+  <p:cSld>
+    <p:spTree>
+      <p:nvGrpSpPr>
+        <p:cNvPr id="1" name=""/>
+        <p:cNvGrpSpPr/>
+        <p:nvPr/>
+      </p:nvGrpSpPr>
+      <p:grpSpPr>
+        <a:xfrm>
+          <a:off x="0" y="0"/>
+          <a:ext cx="0" cy="0"/>
+          <a:chOff x="0" y="0"/>
+          <a:chExt cx="0" cy="0"/>
+        </a:xfrm>
+      </p:grpSpPr>
+      <p:sp>
+        <p:nvSpPr>
+          <p:cNvPr id="4" name="正方形/長方形 3">
+            <a:extLst>
+              <a:ext uri="{FF2B5EF4-FFF2-40B4-BE49-F238E27FC236}">
+                <a16:creationId xmlns:a16="http://schemas.microsoft.com/office/drawing/2014/main" id="{CEA37269-60B0-AC40-B2C4-EFDE97C233D8}"/>
+              </a:ext>
+            </a:extLst>
+          </p:cNvPr>
+          <p:cNvSpPr/>
+          <p:nvPr/>
+        </p:nvSpPr>
+        <p:spPr>
+          <a:xfrm>
+            <a:off x="2399251" y="607701"/>
+            <a:ext cx="3130477" cy="1237262"/>
+          </a:xfrm>
+          <a:prstGeom prst="rect">
+            <a:avLst/>
+          </a:prstGeom>
+          <a:noFill/>
+          <a:ln w="28575">
+            <a:solidFill>
+              <a:schemeClr val="tx1"/>
+            </a:solidFill>
+          </a:ln>
+        </p:spPr>
+        <p:style>
+          <a:lnRef idx="2">
+            <a:schemeClr val="accent1">
+              <a:shade val="50000"/>
+            </a:schemeClr>
+          </a:lnRef>
+          <a:fillRef idx="1">
+            <a:schemeClr val="accent1"/>
+          </a:fillRef>
+          <a:effectRef idx="0">
+            <a:schemeClr val="accent1"/>
+          </a:effectRef>
+          <a:fontRef idx="minor">
+            <a:schemeClr val="lt1"/>
+          </a:fontRef>
+        </p:style>
+        <p:txBody>
+          <a:bodyPr rtlCol="0" anchor="ctr"/>
+          <a:lstStyle/>
+          <a:p>
+            <a:pPr algn="r"/>
+            <a:endParaRPr kumimoji="1" lang="ja-JP" altLang="en-US"/>
+          </a:p>
+        </p:txBody>
+      </p:sp>
+      <p:sp>
+        <p:nvSpPr>
+          <p:cNvPr id="12" name="テキスト ボックス 11">
+            <a:extLst>
+              <a:ext uri="{FF2B5EF4-FFF2-40B4-BE49-F238E27FC236}">
+                <a16:creationId xmlns:a16="http://schemas.microsoft.com/office/drawing/2014/main" id="{45E55EFA-4D47-EF44-8DBC-07C56949663B}"/>
+              </a:ext>
+            </a:extLst>
+          </p:cNvPr>
+          <p:cNvSpPr txBox="1"/>
+          <p:nvPr/>
+        </p:nvSpPr>
+        <p:spPr>
+          <a:xfrm>
+            <a:off x="6515976" y="971358"/>
+            <a:ext cx="2985113" cy="584775"/>
+          </a:xfrm>
+          <a:prstGeom prst="rect">
+            <a:avLst/>
+          </a:prstGeom>
+          <a:noFill/>
+        </p:spPr>
+        <p:txBody>
+          <a:bodyPr wrap="none" rtlCol="0">
+            <a:spAutoFit/>
+          </a:bodyPr>
+          <a:lstStyle/>
+          <a:p>
+            <a:endParaRPr lang="en-US" altLang="ja-JP" sz="1600" dirty="0"/>
+          </a:p>
+          <a:p>
+            <a:r>
+              <a:rPr lang="en-US" altLang="ja-JP" sz="1600" dirty="0" err="1"/>
+              <a:t>wsize</a:t>
+            </a:r>
+            <a:r>
+              <a:rPr lang="en-US" altLang="ja-JP" sz="1600" dirty="0"/>
+              <a:t> = </a:t>
+            </a:r>
+            <a:r>
+              <a:rPr lang="en-US" altLang="ja-JP" sz="1600" dirty="0" err="1"/>
+              <a:t>SSL_read</a:t>
+            </a:r>
+            <a:r>
+              <a:rPr lang="en-US" altLang="ja-JP" sz="1600" dirty="0"/>
+              <a:t>(msg, </a:t>
+            </a:r>
+            <a:r>
+              <a:rPr lang="en-US" altLang="ja-JP" sz="1600" dirty="0" err="1"/>
+              <a:t>rsize</a:t>
+            </a:r>
+            <a:r>
+              <a:rPr lang="en-US" altLang="ja-JP" sz="1600" dirty="0"/>
+              <a:t>)</a:t>
+            </a:r>
+          </a:p>
+        </p:txBody>
+      </p:sp>
+      <p:sp>
+        <p:nvSpPr>
+          <p:cNvPr id="13" name="テキスト ボックス 12">
+            <a:extLst>
+              <a:ext uri="{FF2B5EF4-FFF2-40B4-BE49-F238E27FC236}">
+                <a16:creationId xmlns:a16="http://schemas.microsoft.com/office/drawing/2014/main" id="{17848185-05C0-4748-87B6-39F13BAE1CBB}"/>
+              </a:ext>
+            </a:extLst>
+          </p:cNvPr>
+          <p:cNvSpPr txBox="1"/>
+          <p:nvPr/>
+        </p:nvSpPr>
+        <p:spPr>
+          <a:xfrm>
+            <a:off x="2659316" y="1226332"/>
+            <a:ext cx="2385589" cy="338554"/>
+          </a:xfrm>
+          <a:prstGeom prst="rect">
+            <a:avLst/>
+          </a:prstGeom>
+          <a:noFill/>
+        </p:spPr>
+        <p:txBody>
+          <a:bodyPr wrap="none" rtlCol="0">
+            <a:spAutoFit/>
+          </a:bodyPr>
+          <a:lstStyle/>
+          <a:p>
+            <a:pPr algn="r"/>
+            <a:r>
+              <a:rPr lang="en-US" altLang="ja-JP" sz="1600" dirty="0" err="1"/>
+              <a:t>SSL_write</a:t>
+            </a:r>
+            <a:r>
+              <a:rPr lang="en-US" altLang="ja-JP" sz="1600" dirty="0"/>
+              <a:t>(msg, </a:t>
+            </a:r>
+            <a:r>
+              <a:rPr lang="en-US" altLang="ja-JP" sz="1600" dirty="0" err="1"/>
+              <a:t>wsize</a:t>
+            </a:r>
+            <a:r>
+              <a:rPr lang="en-US" altLang="ja-JP" sz="1600" dirty="0"/>
+              <a:t>);</a:t>
+            </a:r>
+            <a:endParaRPr kumimoji="1" lang="en-US" altLang="ja-JP" sz="1600" dirty="0"/>
+          </a:p>
+        </p:txBody>
+      </p:sp>
+      <p:sp>
+        <p:nvSpPr>
+          <p:cNvPr id="14" name="テキスト ボックス 13">
+            <a:extLst>
+              <a:ext uri="{FF2B5EF4-FFF2-40B4-BE49-F238E27FC236}">
+                <a16:creationId xmlns:a16="http://schemas.microsoft.com/office/drawing/2014/main" id="{C1BC8E4D-0917-D449-9C87-007A7F4A0832}"/>
+              </a:ext>
+            </a:extLst>
+          </p:cNvPr>
+          <p:cNvSpPr txBox="1"/>
+          <p:nvPr/>
+        </p:nvSpPr>
+        <p:spPr>
+          <a:xfrm>
+            <a:off x="2631893" y="173513"/>
+            <a:ext cx="2236510" cy="400110"/>
+          </a:xfrm>
+          <a:prstGeom prst="rect">
+            <a:avLst/>
+          </a:prstGeom>
+          <a:noFill/>
+        </p:spPr>
+        <p:txBody>
+          <a:bodyPr wrap="none" rtlCol="0">
+            <a:spAutoFit/>
+          </a:bodyPr>
+          <a:lstStyle/>
+          <a:p>
+            <a:r>
+              <a:rPr kumimoji="1" lang="ja-JP" altLang="en-US" sz="2000"/>
+              <a:t>メッセージ送信側</a:t>
+            </a:r>
+          </a:p>
+        </p:txBody>
+      </p:sp>
+      <p:sp>
+        <p:nvSpPr>
+          <p:cNvPr id="15" name="テキスト ボックス 14">
+            <a:extLst>
+              <a:ext uri="{FF2B5EF4-FFF2-40B4-BE49-F238E27FC236}">
+                <a16:creationId xmlns:a16="http://schemas.microsoft.com/office/drawing/2014/main" id="{DA8C505F-0DA8-9C49-A968-F05BFAEE9262}"/>
+              </a:ext>
+            </a:extLst>
+          </p:cNvPr>
+          <p:cNvSpPr txBox="1"/>
+          <p:nvPr/>
+        </p:nvSpPr>
+        <p:spPr>
+          <a:xfrm>
+            <a:off x="7361173" y="145148"/>
+            <a:ext cx="2236510" cy="400110"/>
+          </a:xfrm>
+          <a:prstGeom prst="rect">
+            <a:avLst/>
+          </a:prstGeom>
+          <a:noFill/>
+        </p:spPr>
+        <p:txBody>
+          <a:bodyPr wrap="none" rtlCol="0">
+            <a:spAutoFit/>
+          </a:bodyPr>
+          <a:lstStyle/>
+          <a:p>
+            <a:r>
+              <a:rPr kumimoji="1" lang="ja-JP" altLang="en-US" sz="2000"/>
+              <a:t>メッセージ受信側</a:t>
+            </a:r>
+          </a:p>
+        </p:txBody>
+      </p:sp>
+      <p:sp>
+        <p:nvSpPr>
+          <p:cNvPr id="16" name="正方形/長方形 15">
+            <a:extLst>
+              <a:ext uri="{FF2B5EF4-FFF2-40B4-BE49-F238E27FC236}">
+                <a16:creationId xmlns:a16="http://schemas.microsoft.com/office/drawing/2014/main" id="{28E4675F-7AE0-9F4E-B955-B997365C2342}"/>
+              </a:ext>
+            </a:extLst>
+          </p:cNvPr>
+          <p:cNvSpPr/>
+          <p:nvPr/>
+        </p:nvSpPr>
+        <p:spPr>
+          <a:xfrm>
+            <a:off x="6370612" y="573623"/>
+            <a:ext cx="3130477" cy="1237262"/>
+          </a:xfrm>
+          <a:prstGeom prst="rect">
+            <a:avLst/>
+          </a:prstGeom>
+          <a:noFill/>
+          <a:ln w="28575">
+            <a:solidFill>
+              <a:schemeClr val="tx1"/>
+            </a:solidFill>
+          </a:ln>
+        </p:spPr>
+        <p:style>
+          <a:lnRef idx="2">
+            <a:schemeClr val="accent1">
+              <a:shade val="50000"/>
+            </a:schemeClr>
+          </a:lnRef>
+          <a:fillRef idx="1">
+            <a:schemeClr val="accent1"/>
+          </a:fillRef>
+          <a:effectRef idx="0">
+            <a:schemeClr val="accent1"/>
+          </a:effectRef>
+          <a:fontRef idx="minor">
+            <a:schemeClr val="lt1"/>
+          </a:fontRef>
+        </p:style>
+        <p:txBody>
+          <a:bodyPr rtlCol="0" anchor="ctr"/>
+          <a:lstStyle/>
+          <a:p>
+            <a:pPr algn="r"/>
+            <a:endParaRPr kumimoji="1" lang="ja-JP" altLang="en-US"/>
+          </a:p>
+        </p:txBody>
+      </p:sp>
+      <p:sp>
+        <p:nvSpPr>
+          <p:cNvPr id="17" name="正方形/長方形 16">
+            <a:extLst>
+              <a:ext uri="{FF2B5EF4-FFF2-40B4-BE49-F238E27FC236}">
+                <a16:creationId xmlns:a16="http://schemas.microsoft.com/office/drawing/2014/main" id="{7BDE5ED8-871E-7D43-A3EE-46BB47AABB1F}"/>
+              </a:ext>
+            </a:extLst>
+          </p:cNvPr>
+          <p:cNvSpPr/>
+          <p:nvPr/>
+        </p:nvSpPr>
+        <p:spPr>
+          <a:xfrm>
+            <a:off x="3470387" y="2416276"/>
+            <a:ext cx="1471709" cy="367023"/>
+          </a:xfrm>
+          <a:prstGeom prst="rect">
+            <a:avLst/>
+          </a:prstGeom>
+          <a:noFill/>
+          <a:ln w="28575">
+            <a:solidFill>
+              <a:schemeClr val="tx1"/>
+            </a:solidFill>
+          </a:ln>
+        </p:spPr>
+        <p:style>
+          <a:lnRef idx="2">
+            <a:schemeClr val="accent1">
+              <a:shade val="50000"/>
+            </a:schemeClr>
+          </a:lnRef>
+          <a:fillRef idx="1">
+            <a:schemeClr val="accent1"/>
+          </a:fillRef>
+          <a:effectRef idx="0">
+            <a:schemeClr val="accent1"/>
+          </a:effectRef>
+          <a:fontRef idx="minor">
+            <a:schemeClr val="lt1"/>
+          </a:fontRef>
+        </p:style>
+        <p:txBody>
+          <a:bodyPr rtlCol="0" anchor="ctr"/>
+          <a:lstStyle/>
+          <a:p>
+            <a:pPr algn="r"/>
+            <a:endParaRPr kumimoji="1" lang="ja-JP" altLang="en-US"/>
+          </a:p>
+        </p:txBody>
+      </p:sp>
+      <p:sp>
+        <p:nvSpPr>
+          <p:cNvPr id="19" name="正方形/長方形 18">
+            <a:extLst>
+              <a:ext uri="{FF2B5EF4-FFF2-40B4-BE49-F238E27FC236}">
+                <a16:creationId xmlns:a16="http://schemas.microsoft.com/office/drawing/2014/main" id="{766126A7-8D34-384E-8555-A3E3E1FB7390}"/>
+              </a:ext>
+            </a:extLst>
+          </p:cNvPr>
+          <p:cNvSpPr/>
+          <p:nvPr/>
+        </p:nvSpPr>
+        <p:spPr>
+          <a:xfrm>
+            <a:off x="7478960" y="2416276"/>
+            <a:ext cx="1471709" cy="367023"/>
+          </a:xfrm>
+          <a:prstGeom prst="rect">
+            <a:avLst/>
+          </a:prstGeom>
+          <a:noFill/>
+          <a:ln w="28575">
+            <a:solidFill>
+              <a:schemeClr val="tx1"/>
+            </a:solidFill>
+          </a:ln>
+        </p:spPr>
+        <p:style>
+          <a:lnRef idx="2">
+            <a:schemeClr val="accent1">
+              <a:shade val="50000"/>
+            </a:schemeClr>
+          </a:lnRef>
+          <a:fillRef idx="1">
+            <a:schemeClr val="accent1"/>
+          </a:fillRef>
+          <a:effectRef idx="0">
+            <a:schemeClr val="accent1"/>
+          </a:effectRef>
+          <a:fontRef idx="minor">
+            <a:schemeClr val="lt1"/>
+          </a:fontRef>
+        </p:style>
+        <p:txBody>
+          <a:bodyPr rtlCol="0" anchor="ctr"/>
+          <a:lstStyle/>
+          <a:p>
+            <a:pPr algn="r"/>
+            <a:endParaRPr kumimoji="1" lang="ja-JP" altLang="en-US"/>
+          </a:p>
+        </p:txBody>
+      </p:sp>
+      <p:cxnSp>
+        <p:nvCxnSpPr>
+          <p:cNvPr id="21" name="直線コネクタ 20">
+            <a:extLst>
+              <a:ext uri="{FF2B5EF4-FFF2-40B4-BE49-F238E27FC236}">
+                <a16:creationId xmlns:a16="http://schemas.microsoft.com/office/drawing/2014/main" id="{C0D8F92B-D74E-C748-93EA-8725A59A780F}"/>
+              </a:ext>
+            </a:extLst>
+          </p:cNvPr>
+          <p:cNvCxnSpPr>
+            <a:cxnSpLocks/>
+          </p:cNvCxnSpPr>
+          <p:nvPr/>
+        </p:nvCxnSpPr>
+        <p:spPr>
+          <a:xfrm flipH="1">
+            <a:off x="4110293" y="1559307"/>
+            <a:ext cx="1" cy="851390"/>
+          </a:xfrm>
+          <a:prstGeom prst="line">
+            <a:avLst/>
+          </a:prstGeom>
+          <a:ln>
+            <a:solidFill>
+              <a:schemeClr val="tx1"/>
+            </a:solidFill>
+            <a:headEnd type="none" w="med" len="med"/>
+            <a:tailEnd type="arrow" w="med" len="med"/>
+          </a:ln>
+        </p:spPr>
+        <p:style>
+          <a:lnRef idx="1">
+            <a:schemeClr val="accent1"/>
+          </a:lnRef>
+          <a:fillRef idx="0">
+            <a:schemeClr val="accent1"/>
+          </a:fillRef>
+          <a:effectRef idx="0">
+            <a:schemeClr val="accent1"/>
+          </a:effectRef>
+          <a:fontRef idx="minor">
+            <a:schemeClr val="tx1"/>
+          </a:fontRef>
+        </p:style>
+      </p:cxnSp>
+      <p:cxnSp>
+        <p:nvCxnSpPr>
+          <p:cNvPr id="22" name="直線コネクタ 21">
+            <a:extLst>
+              <a:ext uri="{FF2B5EF4-FFF2-40B4-BE49-F238E27FC236}">
+                <a16:creationId xmlns:a16="http://schemas.microsoft.com/office/drawing/2014/main" id="{9FD4AE35-D3B4-3C49-B812-1DB4DC9CCBAF}"/>
+              </a:ext>
+            </a:extLst>
+          </p:cNvPr>
+          <p:cNvCxnSpPr>
+            <a:cxnSpLocks/>
+          </p:cNvCxnSpPr>
+          <p:nvPr/>
+        </p:nvCxnSpPr>
+        <p:spPr>
+          <a:xfrm flipH="1" flipV="1">
+            <a:off x="8554996" y="1569036"/>
+            <a:ext cx="1" cy="851390"/>
+          </a:xfrm>
+          <a:prstGeom prst="line">
+            <a:avLst/>
+          </a:prstGeom>
+          <a:ln>
+            <a:solidFill>
+              <a:schemeClr val="tx1"/>
+            </a:solidFill>
+            <a:headEnd type="none" w="med" len="med"/>
+            <a:tailEnd type="arrow" w="med" len="med"/>
+          </a:ln>
+        </p:spPr>
+        <p:style>
+          <a:lnRef idx="1">
+            <a:schemeClr val="accent1"/>
+          </a:lnRef>
+          <a:fillRef idx="0">
+            <a:schemeClr val="accent1"/>
+          </a:fillRef>
+          <a:effectRef idx="0">
+            <a:schemeClr val="accent1"/>
+          </a:effectRef>
+          <a:fontRef idx="minor">
+            <a:schemeClr val="tx1"/>
+          </a:fontRef>
+        </p:style>
+      </p:cxnSp>
+      <p:cxnSp>
+        <p:nvCxnSpPr>
+          <p:cNvPr id="23" name="直線コネクタ 22">
+            <a:extLst>
+              <a:ext uri="{FF2B5EF4-FFF2-40B4-BE49-F238E27FC236}">
+                <a16:creationId xmlns:a16="http://schemas.microsoft.com/office/drawing/2014/main" id="{C57868D1-6322-924E-9F68-BC0E9F6E07D8}"/>
+              </a:ext>
+            </a:extLst>
+          </p:cNvPr>
+          <p:cNvCxnSpPr>
+            <a:cxnSpLocks/>
+          </p:cNvCxnSpPr>
+          <p:nvPr/>
+        </p:nvCxnSpPr>
+        <p:spPr>
+          <a:xfrm flipH="1" flipV="1">
+            <a:off x="3470387" y="2951808"/>
+            <a:ext cx="1471710" cy="1"/>
+          </a:xfrm>
+          <a:prstGeom prst="line">
+            <a:avLst/>
+          </a:prstGeom>
+          <a:ln>
+            <a:solidFill>
+              <a:schemeClr val="tx1"/>
+            </a:solidFill>
+            <a:headEnd type="arrow" w="med" len="med"/>
+            <a:tailEnd type="arrow" w="med" len="med"/>
+          </a:ln>
+        </p:spPr>
+        <p:style>
+          <a:lnRef idx="1">
+            <a:schemeClr val="accent1"/>
+          </a:lnRef>
+          <a:fillRef idx="0">
+            <a:schemeClr val="accent1"/>
+          </a:fillRef>
+          <a:effectRef idx="0">
+            <a:schemeClr val="accent1"/>
+          </a:effectRef>
+          <a:fontRef idx="minor">
+            <a:schemeClr val="tx1"/>
+          </a:fontRef>
+        </p:style>
+      </p:cxnSp>
+      <p:sp>
+        <p:nvSpPr>
+          <p:cNvPr id="26" name="テキスト ボックス 25">
+            <a:extLst>
+              <a:ext uri="{FF2B5EF4-FFF2-40B4-BE49-F238E27FC236}">
+                <a16:creationId xmlns:a16="http://schemas.microsoft.com/office/drawing/2014/main" id="{5DB6EF29-A736-5C43-936F-080A82CB442D}"/>
+              </a:ext>
+            </a:extLst>
+          </p:cNvPr>
+          <p:cNvSpPr txBox="1"/>
+          <p:nvPr/>
+        </p:nvSpPr>
+        <p:spPr>
+          <a:xfrm>
+            <a:off x="3964489" y="2935652"/>
+            <a:ext cx="646331" cy="307777"/>
+          </a:xfrm>
+          <a:prstGeom prst="rect">
+            <a:avLst/>
+          </a:prstGeom>
+          <a:noFill/>
+        </p:spPr>
+        <p:txBody>
+          <a:bodyPr wrap="none" rtlCol="0">
+            <a:spAutoFit/>
+          </a:bodyPr>
+          <a:lstStyle/>
+          <a:p>
+            <a:r>
+              <a:rPr kumimoji="1" lang="en-US" altLang="ja-JP" sz="1400" dirty="0" err="1"/>
+              <a:t>wsize</a:t>
+            </a:r>
+            <a:endParaRPr kumimoji="1" lang="ja-JP" altLang="en-US" sz="1400"/>
+          </a:p>
+        </p:txBody>
+      </p:sp>
+      <p:sp>
+        <p:nvSpPr>
+          <p:cNvPr id="27" name="テキスト ボックス 26">
+            <a:extLst>
+              <a:ext uri="{FF2B5EF4-FFF2-40B4-BE49-F238E27FC236}">
+                <a16:creationId xmlns:a16="http://schemas.microsoft.com/office/drawing/2014/main" id="{34D7E0AB-F4DD-6844-975E-734E34633A94}"/>
+              </a:ext>
+            </a:extLst>
+          </p:cNvPr>
+          <p:cNvSpPr txBox="1"/>
+          <p:nvPr/>
+        </p:nvSpPr>
+        <p:spPr>
+          <a:xfrm>
+            <a:off x="7010421" y="654653"/>
+            <a:ext cx="1986441" cy="307777"/>
+          </a:xfrm>
+          <a:prstGeom prst="rect">
+            <a:avLst/>
+          </a:prstGeom>
+          <a:noFill/>
+        </p:spPr>
+        <p:txBody>
+          <a:bodyPr wrap="none" rtlCol="0">
+            <a:spAutoFit/>
+          </a:bodyPr>
+          <a:lstStyle/>
+          <a:p>
+            <a:r>
+              <a:rPr kumimoji="1" lang="en-US" altLang="ja-JP" sz="1400" u="sng" dirty="0" err="1"/>
+              <a:t>wsize</a:t>
+            </a:r>
+            <a:r>
+              <a:rPr kumimoji="1" lang="en-US" altLang="ja-JP" sz="1400" u="sng" dirty="0"/>
+              <a:t> &lt;= </a:t>
+            </a:r>
+            <a:r>
+              <a:rPr kumimoji="1" lang="en-US" altLang="ja-JP" sz="1400" u="sng" dirty="0" err="1"/>
+              <a:t>rsize</a:t>
+            </a:r>
+            <a:r>
+              <a:rPr kumimoji="1" lang="en-US" altLang="ja-JP" sz="1400" u="sng" dirty="0"/>
+              <a:t> </a:t>
+            </a:r>
+            <a:r>
+              <a:rPr kumimoji="1" lang="ja-JP" altLang="en-US" sz="1400" u="sng"/>
+              <a:t>を指定</a:t>
+            </a:r>
+          </a:p>
+        </p:txBody>
+      </p:sp>
+      <p:cxnSp>
+        <p:nvCxnSpPr>
+          <p:cNvPr id="28" name="直線コネクタ 27">
+            <a:extLst>
+              <a:ext uri="{FF2B5EF4-FFF2-40B4-BE49-F238E27FC236}">
+                <a16:creationId xmlns:a16="http://schemas.microsoft.com/office/drawing/2014/main" id="{F227EB3D-74A4-EF4F-B725-DAC289EAABE0}"/>
+              </a:ext>
+            </a:extLst>
+          </p:cNvPr>
+          <p:cNvCxnSpPr>
+            <a:cxnSpLocks/>
+          </p:cNvCxnSpPr>
+          <p:nvPr/>
+        </p:nvCxnSpPr>
+        <p:spPr>
+          <a:xfrm flipH="1" flipV="1">
+            <a:off x="7468201" y="2947937"/>
+            <a:ext cx="1471710" cy="1"/>
+          </a:xfrm>
+          <a:prstGeom prst="line">
+            <a:avLst/>
+          </a:prstGeom>
+          <a:ln>
+            <a:solidFill>
+              <a:schemeClr val="tx1"/>
+            </a:solidFill>
+            <a:headEnd type="arrow" w="med" len="med"/>
+            <a:tailEnd type="arrow" w="med" len="med"/>
+          </a:ln>
+        </p:spPr>
+        <p:style>
+          <a:lnRef idx="1">
+            <a:schemeClr val="accent1"/>
+          </a:lnRef>
+          <a:fillRef idx="0">
+            <a:schemeClr val="accent1"/>
+          </a:fillRef>
+          <a:effectRef idx="0">
+            <a:schemeClr val="accent1"/>
+          </a:effectRef>
+          <a:fontRef idx="minor">
+            <a:schemeClr val="tx1"/>
+          </a:fontRef>
+        </p:style>
+      </p:cxnSp>
+      <p:sp>
+        <p:nvSpPr>
+          <p:cNvPr id="29" name="テキスト ボックス 28">
+            <a:extLst>
+              <a:ext uri="{FF2B5EF4-FFF2-40B4-BE49-F238E27FC236}">
+                <a16:creationId xmlns:a16="http://schemas.microsoft.com/office/drawing/2014/main" id="{BDB657A1-6231-304F-BE61-DA2B35804520}"/>
+              </a:ext>
+            </a:extLst>
+          </p:cNvPr>
+          <p:cNvSpPr txBox="1"/>
+          <p:nvPr/>
+        </p:nvSpPr>
+        <p:spPr>
+          <a:xfrm>
+            <a:off x="7962303" y="2931781"/>
+            <a:ext cx="646331" cy="307777"/>
+          </a:xfrm>
+          <a:prstGeom prst="rect">
+            <a:avLst/>
+          </a:prstGeom>
+          <a:noFill/>
+        </p:spPr>
+        <p:txBody>
+          <a:bodyPr wrap="none" rtlCol="0">
+            <a:spAutoFit/>
+          </a:bodyPr>
+          <a:lstStyle/>
+          <a:p>
+            <a:r>
+              <a:rPr kumimoji="1" lang="en-US" altLang="ja-JP" sz="1400" dirty="0" err="1"/>
+              <a:t>wsize</a:t>
+            </a:r>
+            <a:endParaRPr kumimoji="1" lang="ja-JP" altLang="en-US" sz="1400"/>
+          </a:p>
+        </p:txBody>
+      </p:sp>
+      <p:cxnSp>
+        <p:nvCxnSpPr>
+          <p:cNvPr id="30" name="直線コネクタ 29">
+            <a:extLst>
+              <a:ext uri="{FF2B5EF4-FFF2-40B4-BE49-F238E27FC236}">
+                <a16:creationId xmlns:a16="http://schemas.microsoft.com/office/drawing/2014/main" id="{5BA1EF53-31EC-2846-BAFB-261FE4A9CB26}"/>
+              </a:ext>
+            </a:extLst>
+          </p:cNvPr>
+          <p:cNvCxnSpPr>
+            <a:cxnSpLocks/>
+          </p:cNvCxnSpPr>
+          <p:nvPr/>
+        </p:nvCxnSpPr>
+        <p:spPr>
+          <a:xfrm flipH="1">
+            <a:off x="4997814" y="2599788"/>
+            <a:ext cx="2427356" cy="1"/>
+          </a:xfrm>
+          <a:prstGeom prst="line">
+            <a:avLst/>
+          </a:prstGeom>
+          <a:ln w="12700">
+            <a:solidFill>
+              <a:schemeClr val="tx1"/>
+            </a:solidFill>
+            <a:prstDash val="dash"/>
+            <a:headEnd type="arrow" w="med" len="med"/>
+            <a:tailEnd type="none" w="med" len="med"/>
+          </a:ln>
+        </p:spPr>
+        <p:style>
+          <a:lnRef idx="1">
+            <a:schemeClr val="accent1"/>
+          </a:lnRef>
+          <a:fillRef idx="0">
+            <a:schemeClr val="accent1"/>
+          </a:fillRef>
+          <a:effectRef idx="0">
+            <a:schemeClr val="accent1"/>
+          </a:effectRef>
+          <a:fontRef idx="minor">
+            <a:schemeClr val="tx1"/>
+          </a:fontRef>
+        </p:style>
+      </p:cxnSp>
+      <p:sp>
+        <p:nvSpPr>
+          <p:cNvPr id="32" name="テキスト ボックス 31">
+            <a:extLst>
+              <a:ext uri="{FF2B5EF4-FFF2-40B4-BE49-F238E27FC236}">
+                <a16:creationId xmlns:a16="http://schemas.microsoft.com/office/drawing/2014/main" id="{B9BD81D7-0565-4A45-8EEB-8C9C275185D1}"/>
+              </a:ext>
+            </a:extLst>
+          </p:cNvPr>
+          <p:cNvSpPr txBox="1"/>
+          <p:nvPr/>
+        </p:nvSpPr>
+        <p:spPr>
+          <a:xfrm>
+            <a:off x="3964489" y="2445898"/>
+            <a:ext cx="527709" cy="307777"/>
+          </a:xfrm>
+          <a:prstGeom prst="rect">
+            <a:avLst/>
+          </a:prstGeom>
+          <a:noFill/>
+        </p:spPr>
+        <p:txBody>
+          <a:bodyPr wrap="none" rtlCol="0">
+            <a:spAutoFit/>
+          </a:bodyPr>
+          <a:lstStyle/>
+          <a:p>
+            <a:r>
+              <a:rPr kumimoji="1" lang="en-US" altLang="ja-JP" sz="1400" dirty="0"/>
+              <a:t>msg</a:t>
+            </a:r>
+            <a:endParaRPr kumimoji="1" lang="ja-JP" altLang="en-US" sz="1400"/>
+          </a:p>
+        </p:txBody>
+      </p:sp>
+      <p:sp>
+        <p:nvSpPr>
+          <p:cNvPr id="33" name="テキスト ボックス 32">
+            <a:extLst>
+              <a:ext uri="{FF2B5EF4-FFF2-40B4-BE49-F238E27FC236}">
+                <a16:creationId xmlns:a16="http://schemas.microsoft.com/office/drawing/2014/main" id="{57C2D0F0-F693-2E46-8C13-9EB7F6C7E856}"/>
+              </a:ext>
+            </a:extLst>
+          </p:cNvPr>
+          <p:cNvSpPr txBox="1"/>
+          <p:nvPr/>
+        </p:nvSpPr>
+        <p:spPr>
+          <a:xfrm>
+            <a:off x="7973061" y="2476213"/>
+            <a:ext cx="527709" cy="307777"/>
+          </a:xfrm>
+          <a:prstGeom prst="rect">
+            <a:avLst/>
+          </a:prstGeom>
+          <a:noFill/>
+        </p:spPr>
+        <p:txBody>
+          <a:bodyPr wrap="none" rtlCol="0">
+            <a:spAutoFit/>
+          </a:bodyPr>
+          <a:lstStyle/>
+          <a:p>
+            <a:r>
+              <a:rPr kumimoji="1" lang="en-US" altLang="ja-JP" sz="1400" dirty="0"/>
+              <a:t>msg</a:t>
+            </a:r>
+            <a:endParaRPr kumimoji="1" lang="ja-JP" altLang="en-US" sz="1400"/>
+          </a:p>
+        </p:txBody>
+      </p:sp>
+      <p:cxnSp>
+        <p:nvCxnSpPr>
+          <p:cNvPr id="34" name="直線コネクタ 33">
+            <a:extLst>
+              <a:ext uri="{FF2B5EF4-FFF2-40B4-BE49-F238E27FC236}">
+                <a16:creationId xmlns:a16="http://schemas.microsoft.com/office/drawing/2014/main" id="{EF15C814-949B-E441-88D9-DDCEA6632436}"/>
+              </a:ext>
+            </a:extLst>
+          </p:cNvPr>
+          <p:cNvCxnSpPr>
+            <a:cxnSpLocks/>
+          </p:cNvCxnSpPr>
+          <p:nvPr/>
+        </p:nvCxnSpPr>
+        <p:spPr>
+          <a:xfrm>
+            <a:off x="8756725" y="896052"/>
+            <a:ext cx="273399" cy="385872"/>
+          </a:xfrm>
+          <a:prstGeom prst="line">
+            <a:avLst/>
+          </a:prstGeom>
+          <a:ln>
+            <a:solidFill>
+              <a:schemeClr val="tx1"/>
+            </a:solidFill>
+            <a:headEnd type="none" w="med" len="med"/>
+            <a:tailEnd type="arrow" w="med" len="med"/>
+          </a:ln>
+        </p:spPr>
+        <p:style>
+          <a:lnRef idx="1">
+            <a:schemeClr val="accent1"/>
+          </a:lnRef>
+          <a:fillRef idx="0">
+            <a:schemeClr val="accent1"/>
+          </a:fillRef>
+          <a:effectRef idx="0">
+            <a:schemeClr val="accent1"/>
+          </a:effectRef>
+          <a:fontRef idx="minor">
+            <a:schemeClr val="tx1"/>
+          </a:fontRef>
+        </p:style>
+      </p:cxnSp>
+      <p:sp>
+        <p:nvSpPr>
+          <p:cNvPr id="38" name="正方形/長方形 37">
+            <a:extLst>
+              <a:ext uri="{FF2B5EF4-FFF2-40B4-BE49-F238E27FC236}">
+                <a16:creationId xmlns:a16="http://schemas.microsoft.com/office/drawing/2014/main" id="{3A6E7194-1CFB-FE49-8FD9-585857BE6FA7}"/>
+              </a:ext>
+            </a:extLst>
+          </p:cNvPr>
+          <p:cNvSpPr/>
+          <p:nvPr/>
+        </p:nvSpPr>
+        <p:spPr>
+          <a:xfrm>
+            <a:off x="2369821" y="4221274"/>
+            <a:ext cx="3130477" cy="1237262"/>
+          </a:xfrm>
+          <a:prstGeom prst="rect">
+            <a:avLst/>
+          </a:prstGeom>
+          <a:noFill/>
+          <a:ln w="28575">
+            <a:solidFill>
+              <a:schemeClr val="tx1"/>
+            </a:solidFill>
+          </a:ln>
+        </p:spPr>
+        <p:style>
+          <a:lnRef idx="2">
+            <a:schemeClr val="accent1">
+              <a:shade val="50000"/>
+            </a:schemeClr>
+          </a:lnRef>
+          <a:fillRef idx="1">
+            <a:schemeClr val="accent1"/>
+          </a:fillRef>
+          <a:effectRef idx="0">
+            <a:schemeClr val="accent1"/>
+          </a:effectRef>
+          <a:fontRef idx="minor">
+            <a:schemeClr val="lt1"/>
+          </a:fontRef>
+        </p:style>
+        <p:txBody>
+          <a:bodyPr rtlCol="0" anchor="ctr"/>
+          <a:lstStyle/>
+          <a:p>
+            <a:pPr algn="r"/>
+            <a:endParaRPr kumimoji="1" lang="ja-JP" altLang="en-US"/>
+          </a:p>
+        </p:txBody>
+      </p:sp>
+      <p:sp>
+        <p:nvSpPr>
+          <p:cNvPr id="39" name="テキスト ボックス 38">
+            <a:extLst>
+              <a:ext uri="{FF2B5EF4-FFF2-40B4-BE49-F238E27FC236}">
+                <a16:creationId xmlns:a16="http://schemas.microsoft.com/office/drawing/2014/main" id="{18FE4B63-B11E-454A-8D33-BE5C1F48EF2B}"/>
+              </a:ext>
+            </a:extLst>
+          </p:cNvPr>
+          <p:cNvSpPr txBox="1"/>
+          <p:nvPr/>
+        </p:nvSpPr>
+        <p:spPr>
+          <a:xfrm>
+            <a:off x="6394867" y="4921254"/>
+            <a:ext cx="3953326" cy="338554"/>
+          </a:xfrm>
+          <a:prstGeom prst="rect">
+            <a:avLst/>
+          </a:prstGeom>
+          <a:noFill/>
+        </p:spPr>
+        <p:txBody>
+          <a:bodyPr wrap="none" rtlCol="0">
+            <a:spAutoFit/>
+          </a:bodyPr>
+          <a:lstStyle/>
+          <a:p>
+            <a:r>
+              <a:rPr lang="en-US" altLang="ja-JP" sz="1600" dirty="0"/>
+              <a:t>Max or Fraction = </a:t>
+            </a:r>
+            <a:r>
+              <a:rPr lang="en-US" altLang="ja-JP" sz="1600" dirty="0" err="1"/>
+              <a:t>SSL_read</a:t>
+            </a:r>
+            <a:r>
+              <a:rPr lang="en-US" altLang="ja-JP" sz="1600" dirty="0"/>
+              <a:t>(msg, </a:t>
+            </a:r>
+            <a:r>
+              <a:rPr lang="en-US" altLang="ja-JP" sz="1600" dirty="0" err="1"/>
+              <a:t>rsize</a:t>
+            </a:r>
+            <a:r>
+              <a:rPr lang="en-US" altLang="ja-JP" sz="1600" dirty="0"/>
+              <a:t>)</a:t>
+            </a:r>
+          </a:p>
+        </p:txBody>
+      </p:sp>
+      <p:sp>
+        <p:nvSpPr>
+          <p:cNvPr id="40" name="テキスト ボックス 39">
+            <a:extLst>
+              <a:ext uri="{FF2B5EF4-FFF2-40B4-BE49-F238E27FC236}">
+                <a16:creationId xmlns:a16="http://schemas.microsoft.com/office/drawing/2014/main" id="{DAC24153-E7D7-5F48-836D-19561FC4B482}"/>
+              </a:ext>
+            </a:extLst>
+          </p:cNvPr>
+          <p:cNvSpPr txBox="1"/>
+          <p:nvPr/>
+        </p:nvSpPr>
+        <p:spPr>
+          <a:xfrm>
+            <a:off x="2685991" y="4839905"/>
+            <a:ext cx="2329484" cy="338554"/>
+          </a:xfrm>
+          <a:prstGeom prst="rect">
+            <a:avLst/>
+          </a:prstGeom>
+          <a:noFill/>
+        </p:spPr>
+        <p:txBody>
+          <a:bodyPr wrap="none" rtlCol="0">
+            <a:spAutoFit/>
+          </a:bodyPr>
+          <a:lstStyle/>
+          <a:p>
+            <a:pPr algn="r"/>
+            <a:r>
+              <a:rPr lang="en-US" altLang="ja-JP" sz="1600" dirty="0" err="1"/>
+              <a:t>SSL_write</a:t>
+            </a:r>
+            <a:r>
+              <a:rPr lang="en-US" altLang="ja-JP" sz="1600" dirty="0"/>
+              <a:t>(msg, large);</a:t>
+            </a:r>
+            <a:endParaRPr kumimoji="1" lang="en-US" altLang="ja-JP" sz="1600" dirty="0"/>
+          </a:p>
+        </p:txBody>
+      </p:sp>
+      <p:sp>
+        <p:nvSpPr>
+          <p:cNvPr id="41" name="テキスト ボックス 40">
+            <a:extLst>
+              <a:ext uri="{FF2B5EF4-FFF2-40B4-BE49-F238E27FC236}">
+                <a16:creationId xmlns:a16="http://schemas.microsoft.com/office/drawing/2014/main" id="{23F4FBA3-83C3-E646-AB3F-7D65169A9C6A}"/>
+              </a:ext>
+            </a:extLst>
+          </p:cNvPr>
+          <p:cNvSpPr txBox="1"/>
+          <p:nvPr/>
+        </p:nvSpPr>
+        <p:spPr>
+          <a:xfrm>
+            <a:off x="2602463" y="3787086"/>
+            <a:ext cx="2236510" cy="400110"/>
+          </a:xfrm>
+          <a:prstGeom prst="rect">
+            <a:avLst/>
+          </a:prstGeom>
+          <a:noFill/>
+        </p:spPr>
+        <p:txBody>
+          <a:bodyPr wrap="none" rtlCol="0">
+            <a:spAutoFit/>
+          </a:bodyPr>
+          <a:lstStyle/>
+          <a:p>
+            <a:r>
+              <a:rPr kumimoji="1" lang="ja-JP" altLang="en-US" sz="2000"/>
+              <a:t>メッセージ送信側</a:t>
+            </a:r>
+          </a:p>
+        </p:txBody>
+      </p:sp>
+      <p:sp>
+        <p:nvSpPr>
+          <p:cNvPr id="42" name="テキスト ボックス 41">
+            <a:extLst>
+              <a:ext uri="{FF2B5EF4-FFF2-40B4-BE49-F238E27FC236}">
+                <a16:creationId xmlns:a16="http://schemas.microsoft.com/office/drawing/2014/main" id="{A6B67EA3-AD52-C84F-875D-92203F4D8CA8}"/>
+              </a:ext>
+            </a:extLst>
+          </p:cNvPr>
+          <p:cNvSpPr txBox="1"/>
+          <p:nvPr/>
+        </p:nvSpPr>
+        <p:spPr>
+          <a:xfrm>
+            <a:off x="7331743" y="3758721"/>
+            <a:ext cx="2236510" cy="400110"/>
+          </a:xfrm>
+          <a:prstGeom prst="rect">
+            <a:avLst/>
+          </a:prstGeom>
+          <a:noFill/>
+        </p:spPr>
+        <p:txBody>
+          <a:bodyPr wrap="none" rtlCol="0">
+            <a:spAutoFit/>
+          </a:bodyPr>
+          <a:lstStyle/>
+          <a:p>
+            <a:r>
+              <a:rPr kumimoji="1" lang="ja-JP" altLang="en-US" sz="2000"/>
+              <a:t>メッセージ受信側</a:t>
+            </a:r>
+          </a:p>
+        </p:txBody>
+      </p:sp>
+      <p:sp>
+        <p:nvSpPr>
+          <p:cNvPr id="43" name="正方形/長方形 42">
+            <a:extLst>
+              <a:ext uri="{FF2B5EF4-FFF2-40B4-BE49-F238E27FC236}">
+                <a16:creationId xmlns:a16="http://schemas.microsoft.com/office/drawing/2014/main" id="{89C1857E-3269-8F45-A9B5-E0F4F0EC74F5}"/>
+              </a:ext>
+            </a:extLst>
+          </p:cNvPr>
+          <p:cNvSpPr/>
+          <p:nvPr/>
+        </p:nvSpPr>
+        <p:spPr>
+          <a:xfrm>
+            <a:off x="6341182" y="4187196"/>
+            <a:ext cx="4405707" cy="1237262"/>
+          </a:xfrm>
+          <a:prstGeom prst="rect">
+            <a:avLst/>
+          </a:prstGeom>
+          <a:noFill/>
+          <a:ln w="28575">
+            <a:solidFill>
+              <a:schemeClr val="tx1"/>
+            </a:solidFill>
+          </a:ln>
+        </p:spPr>
+        <p:style>
+          <a:lnRef idx="2">
+            <a:schemeClr val="accent1">
+              <a:shade val="50000"/>
+            </a:schemeClr>
+          </a:lnRef>
+          <a:fillRef idx="1">
+            <a:schemeClr val="accent1"/>
+          </a:fillRef>
+          <a:effectRef idx="0">
+            <a:schemeClr val="accent1"/>
+          </a:effectRef>
+          <a:fontRef idx="minor">
+            <a:schemeClr val="lt1"/>
+          </a:fontRef>
+        </p:style>
+        <p:txBody>
+          <a:bodyPr rtlCol="0" anchor="ctr"/>
+          <a:lstStyle/>
+          <a:p>
+            <a:pPr algn="r"/>
+            <a:endParaRPr kumimoji="1" lang="ja-JP" altLang="en-US"/>
+          </a:p>
+        </p:txBody>
+      </p:sp>
+      <p:sp>
+        <p:nvSpPr>
+          <p:cNvPr id="44" name="正方形/長方形 43">
+            <a:extLst>
+              <a:ext uri="{FF2B5EF4-FFF2-40B4-BE49-F238E27FC236}">
+                <a16:creationId xmlns:a16="http://schemas.microsoft.com/office/drawing/2014/main" id="{8D8BEBD0-F476-9041-89C7-B59B68E636AB}"/>
+              </a:ext>
+            </a:extLst>
+          </p:cNvPr>
+          <p:cNvSpPr/>
+          <p:nvPr/>
+        </p:nvSpPr>
+        <p:spPr>
+          <a:xfrm>
+            <a:off x="3440957" y="6029849"/>
+            <a:ext cx="1471709" cy="367023"/>
+          </a:xfrm>
+          <a:prstGeom prst="rect">
+            <a:avLst/>
+          </a:prstGeom>
+          <a:noFill/>
+          <a:ln w="28575">
+            <a:solidFill>
+              <a:schemeClr val="tx1"/>
+            </a:solidFill>
+          </a:ln>
+        </p:spPr>
+        <p:style>
+          <a:lnRef idx="2">
+            <a:schemeClr val="accent1">
+              <a:shade val="50000"/>
+            </a:schemeClr>
+          </a:lnRef>
+          <a:fillRef idx="1">
+            <a:schemeClr val="accent1"/>
+          </a:fillRef>
+          <a:effectRef idx="0">
+            <a:schemeClr val="accent1"/>
+          </a:effectRef>
+          <a:fontRef idx="minor">
+            <a:schemeClr val="lt1"/>
+          </a:fontRef>
+        </p:style>
+        <p:txBody>
+          <a:bodyPr rtlCol="0" anchor="ctr"/>
+          <a:lstStyle/>
+          <a:p>
+            <a:pPr algn="r"/>
+            <a:endParaRPr kumimoji="1" lang="ja-JP" altLang="en-US"/>
+          </a:p>
+        </p:txBody>
+      </p:sp>
+      <p:sp>
+        <p:nvSpPr>
+          <p:cNvPr id="45" name="正方形/長方形 44">
+            <a:extLst>
+              <a:ext uri="{FF2B5EF4-FFF2-40B4-BE49-F238E27FC236}">
+                <a16:creationId xmlns:a16="http://schemas.microsoft.com/office/drawing/2014/main" id="{082550AD-C3F2-E846-953B-B943C66A0BD1}"/>
+              </a:ext>
+            </a:extLst>
+          </p:cNvPr>
+          <p:cNvSpPr/>
+          <p:nvPr/>
+        </p:nvSpPr>
+        <p:spPr>
+          <a:xfrm>
+            <a:off x="7783019" y="6029849"/>
+            <a:ext cx="1471709" cy="367023"/>
+          </a:xfrm>
+          <a:prstGeom prst="rect">
+            <a:avLst/>
+          </a:prstGeom>
+          <a:noFill/>
+          <a:ln w="28575">
+            <a:solidFill>
+              <a:schemeClr val="tx1"/>
+            </a:solidFill>
+          </a:ln>
+        </p:spPr>
+        <p:style>
+          <a:lnRef idx="2">
+            <a:schemeClr val="accent1">
+              <a:shade val="50000"/>
+            </a:schemeClr>
+          </a:lnRef>
+          <a:fillRef idx="1">
+            <a:schemeClr val="accent1"/>
+          </a:fillRef>
+          <a:effectRef idx="0">
+            <a:schemeClr val="accent1"/>
+          </a:effectRef>
+          <a:fontRef idx="minor">
+            <a:schemeClr val="lt1"/>
+          </a:fontRef>
+        </p:style>
+        <p:txBody>
+          <a:bodyPr rtlCol="0" anchor="ctr"/>
+          <a:lstStyle/>
+          <a:p>
+            <a:pPr algn="r"/>
+            <a:endParaRPr kumimoji="1" lang="ja-JP" altLang="en-US"/>
+          </a:p>
+        </p:txBody>
+      </p:sp>
+      <p:cxnSp>
+        <p:nvCxnSpPr>
+          <p:cNvPr id="46" name="直線コネクタ 45">
+            <a:extLst>
+              <a:ext uri="{FF2B5EF4-FFF2-40B4-BE49-F238E27FC236}">
+                <a16:creationId xmlns:a16="http://schemas.microsoft.com/office/drawing/2014/main" id="{43333C10-BEA2-AB45-BA63-FB2F89189BA5}"/>
+              </a:ext>
+            </a:extLst>
+          </p:cNvPr>
+          <p:cNvCxnSpPr>
+            <a:cxnSpLocks/>
+          </p:cNvCxnSpPr>
+          <p:nvPr/>
+        </p:nvCxnSpPr>
+        <p:spPr>
+          <a:xfrm flipH="1">
+            <a:off x="4080864" y="5172880"/>
+            <a:ext cx="1" cy="646389"/>
+          </a:xfrm>
+          <a:prstGeom prst="line">
+            <a:avLst/>
+          </a:prstGeom>
+          <a:ln>
+            <a:solidFill>
+              <a:schemeClr val="tx1"/>
+            </a:solidFill>
+            <a:headEnd type="none" w="med" len="med"/>
+            <a:tailEnd type="arrow" w="med" len="med"/>
+          </a:ln>
+        </p:spPr>
+        <p:style>
+          <a:lnRef idx="1">
+            <a:schemeClr val="accent1"/>
+          </a:lnRef>
+          <a:fillRef idx="0">
+            <a:schemeClr val="accent1"/>
+          </a:fillRef>
+          <a:effectRef idx="0">
+            <a:schemeClr val="accent1"/>
+          </a:effectRef>
+          <a:fontRef idx="minor">
+            <a:schemeClr val="tx1"/>
+          </a:fontRef>
+        </p:style>
+      </p:cxnSp>
+      <p:cxnSp>
+        <p:nvCxnSpPr>
+          <p:cNvPr id="47" name="直線コネクタ 46">
+            <a:extLst>
+              <a:ext uri="{FF2B5EF4-FFF2-40B4-BE49-F238E27FC236}">
+                <a16:creationId xmlns:a16="http://schemas.microsoft.com/office/drawing/2014/main" id="{CFDACF4A-3F01-2040-9934-37DCF99A8123}"/>
+              </a:ext>
+            </a:extLst>
+          </p:cNvPr>
+          <p:cNvCxnSpPr>
+            <a:cxnSpLocks/>
+          </p:cNvCxnSpPr>
+          <p:nvPr/>
+        </p:nvCxnSpPr>
+        <p:spPr>
+          <a:xfrm flipH="1" flipV="1">
+            <a:off x="8525566" y="5182609"/>
+            <a:ext cx="1" cy="851390"/>
+          </a:xfrm>
+          <a:prstGeom prst="line">
+            <a:avLst/>
+          </a:prstGeom>
+          <a:ln>
+            <a:solidFill>
+              <a:schemeClr val="tx1"/>
+            </a:solidFill>
+            <a:headEnd type="none" w="med" len="med"/>
+            <a:tailEnd type="arrow" w="med" len="med"/>
+          </a:ln>
+        </p:spPr>
+        <p:style>
+          <a:lnRef idx="1">
+            <a:schemeClr val="accent1"/>
+          </a:lnRef>
+          <a:fillRef idx="0">
+            <a:schemeClr val="accent1"/>
+          </a:fillRef>
+          <a:effectRef idx="0">
+            <a:schemeClr val="accent1"/>
+          </a:effectRef>
+          <a:fontRef idx="minor">
+            <a:schemeClr val="tx1"/>
+          </a:fontRef>
+        </p:style>
+      </p:cxnSp>
+      <p:cxnSp>
+        <p:nvCxnSpPr>
+          <p:cNvPr id="48" name="直線コネクタ 47">
+            <a:extLst>
+              <a:ext uri="{FF2B5EF4-FFF2-40B4-BE49-F238E27FC236}">
+                <a16:creationId xmlns:a16="http://schemas.microsoft.com/office/drawing/2014/main" id="{D392707C-D896-5D48-9C64-36E970003834}"/>
+              </a:ext>
+            </a:extLst>
+          </p:cNvPr>
+          <p:cNvCxnSpPr>
+            <a:cxnSpLocks/>
+          </p:cNvCxnSpPr>
+          <p:nvPr/>
+        </p:nvCxnSpPr>
+        <p:spPr>
+          <a:xfrm flipH="1" flipV="1">
+            <a:off x="3440957" y="6565381"/>
+            <a:ext cx="1471710" cy="1"/>
+          </a:xfrm>
+          <a:prstGeom prst="line">
+            <a:avLst/>
+          </a:prstGeom>
+          <a:ln>
+            <a:solidFill>
+              <a:schemeClr val="tx1"/>
+            </a:solidFill>
+            <a:headEnd type="arrow" w="med" len="med"/>
+            <a:tailEnd type="arrow" w="med" len="med"/>
+          </a:ln>
+        </p:spPr>
+        <p:style>
+          <a:lnRef idx="1">
+            <a:schemeClr val="accent1"/>
+          </a:lnRef>
+          <a:fillRef idx="0">
+            <a:schemeClr val="accent1"/>
+          </a:fillRef>
+          <a:effectRef idx="0">
+            <a:schemeClr val="accent1"/>
+          </a:effectRef>
+          <a:fontRef idx="minor">
+            <a:schemeClr val="tx1"/>
+          </a:fontRef>
+        </p:style>
+      </p:cxnSp>
+      <p:sp>
+        <p:nvSpPr>
+          <p:cNvPr id="50" name="テキスト ボックス 49">
+            <a:extLst>
+              <a:ext uri="{FF2B5EF4-FFF2-40B4-BE49-F238E27FC236}">
+                <a16:creationId xmlns:a16="http://schemas.microsoft.com/office/drawing/2014/main" id="{79FB4FC0-4708-624E-9E74-A57EA5AC703B}"/>
+              </a:ext>
+            </a:extLst>
+          </p:cNvPr>
+          <p:cNvSpPr txBox="1"/>
+          <p:nvPr/>
+        </p:nvSpPr>
+        <p:spPr>
+          <a:xfrm>
+            <a:off x="7233158" y="4288010"/>
+            <a:ext cx="2433680" cy="307777"/>
+          </a:xfrm>
+          <a:prstGeom prst="rect">
+            <a:avLst/>
+          </a:prstGeom>
+          <a:noFill/>
+        </p:spPr>
+        <p:txBody>
+          <a:bodyPr wrap="none" rtlCol="0">
+            <a:spAutoFit/>
+          </a:bodyPr>
+          <a:lstStyle/>
+          <a:p>
+            <a:r>
+              <a:rPr kumimoji="1" lang="en-US" altLang="ja-JP" sz="1400" u="sng" dirty="0"/>
+              <a:t>Max rec size &lt; </a:t>
+            </a:r>
+            <a:r>
+              <a:rPr kumimoji="1" lang="en-US" altLang="ja-JP" sz="1400" u="sng" dirty="0" err="1"/>
+              <a:t>rsize</a:t>
+            </a:r>
+            <a:r>
+              <a:rPr kumimoji="1" lang="en-US" altLang="ja-JP" sz="1400" u="sng" dirty="0"/>
+              <a:t> </a:t>
+            </a:r>
+            <a:r>
+              <a:rPr kumimoji="1" lang="ja-JP" altLang="en-US" sz="1400" u="sng"/>
+              <a:t>を指定</a:t>
+            </a:r>
+          </a:p>
+        </p:txBody>
+      </p:sp>
+      <p:cxnSp>
+        <p:nvCxnSpPr>
+          <p:cNvPr id="51" name="直線コネクタ 50">
+            <a:extLst>
+              <a:ext uri="{FF2B5EF4-FFF2-40B4-BE49-F238E27FC236}">
+                <a16:creationId xmlns:a16="http://schemas.microsoft.com/office/drawing/2014/main" id="{9DC1C3B7-C261-384F-8E63-5B3D73AA7A4A}"/>
+              </a:ext>
+            </a:extLst>
+          </p:cNvPr>
+          <p:cNvCxnSpPr>
+            <a:cxnSpLocks/>
+          </p:cNvCxnSpPr>
+          <p:nvPr/>
+        </p:nvCxnSpPr>
+        <p:spPr>
+          <a:xfrm flipH="1" flipV="1">
+            <a:off x="7772260" y="6561510"/>
+            <a:ext cx="1471710" cy="1"/>
+          </a:xfrm>
+          <a:prstGeom prst="line">
+            <a:avLst/>
+          </a:prstGeom>
+          <a:ln>
+            <a:solidFill>
+              <a:schemeClr val="tx1"/>
+            </a:solidFill>
+            <a:headEnd type="arrow" w="med" len="med"/>
+            <a:tailEnd type="arrow" w="med" len="med"/>
+          </a:ln>
+        </p:spPr>
+        <p:style>
+          <a:lnRef idx="1">
+            <a:schemeClr val="accent1"/>
+          </a:lnRef>
+          <a:fillRef idx="0">
+            <a:schemeClr val="accent1"/>
+          </a:fillRef>
+          <a:effectRef idx="0">
+            <a:schemeClr val="accent1"/>
+          </a:effectRef>
+          <a:fontRef idx="minor">
+            <a:schemeClr val="tx1"/>
+          </a:fontRef>
+        </p:style>
+      </p:cxnSp>
+      <p:sp>
+        <p:nvSpPr>
+          <p:cNvPr id="52" name="テキスト ボックス 51">
+            <a:extLst>
+              <a:ext uri="{FF2B5EF4-FFF2-40B4-BE49-F238E27FC236}">
+                <a16:creationId xmlns:a16="http://schemas.microsoft.com/office/drawing/2014/main" id="{2F4DD796-5463-964E-996D-3A7970285A5D}"/>
+              </a:ext>
+            </a:extLst>
+          </p:cNvPr>
+          <p:cNvSpPr txBox="1"/>
+          <p:nvPr/>
+        </p:nvSpPr>
+        <p:spPr>
+          <a:xfrm>
+            <a:off x="7787071" y="6606183"/>
+            <a:ext cx="2637092" cy="307777"/>
+          </a:xfrm>
+          <a:prstGeom prst="rect">
+            <a:avLst/>
+          </a:prstGeom>
+          <a:noFill/>
+        </p:spPr>
+        <p:txBody>
+          <a:bodyPr wrap="square" rtlCol="0">
+            <a:spAutoFit/>
+          </a:bodyPr>
+          <a:lstStyle/>
+          <a:p>
+            <a:r>
+              <a:rPr lang="en-US" altLang="ja-JP" sz="1400" dirty="0"/>
+              <a:t>Max rec size</a:t>
+            </a:r>
+            <a:r>
+              <a:rPr kumimoji="1" lang="en-US" altLang="ja-JP" sz="1400" dirty="0"/>
+              <a:t> / Fraction</a:t>
+            </a:r>
+            <a:endParaRPr kumimoji="1" lang="ja-JP" altLang="en-US" sz="1400"/>
+          </a:p>
+        </p:txBody>
+      </p:sp>
+      <p:cxnSp>
+        <p:nvCxnSpPr>
+          <p:cNvPr id="53" name="直線コネクタ 52">
+            <a:extLst>
+              <a:ext uri="{FF2B5EF4-FFF2-40B4-BE49-F238E27FC236}">
+                <a16:creationId xmlns:a16="http://schemas.microsoft.com/office/drawing/2014/main" id="{AB9096D4-2993-2940-B629-7E4D9DF7D7D0}"/>
+              </a:ext>
+            </a:extLst>
+          </p:cNvPr>
+          <p:cNvCxnSpPr>
+            <a:cxnSpLocks/>
+          </p:cNvCxnSpPr>
+          <p:nvPr/>
+        </p:nvCxnSpPr>
+        <p:spPr>
+          <a:xfrm flipH="1">
+            <a:off x="6154118" y="6230313"/>
+            <a:ext cx="1461693" cy="30312"/>
+          </a:xfrm>
+          <a:prstGeom prst="line">
+            <a:avLst/>
+          </a:prstGeom>
+          <a:ln w="12700">
+            <a:solidFill>
+              <a:schemeClr val="tx1"/>
+            </a:solidFill>
+            <a:prstDash val="dash"/>
+            <a:headEnd type="arrow" w="med" len="med"/>
+            <a:tailEnd type="none" w="med" len="med"/>
+          </a:ln>
+        </p:spPr>
+        <p:style>
+          <a:lnRef idx="1">
+            <a:schemeClr val="accent1"/>
+          </a:lnRef>
+          <a:fillRef idx="0">
+            <a:schemeClr val="accent1"/>
+          </a:fillRef>
+          <a:effectRef idx="0">
+            <a:schemeClr val="accent1"/>
+          </a:effectRef>
+          <a:fontRef idx="minor">
+            <a:schemeClr val="tx1"/>
+          </a:fontRef>
+        </p:style>
+      </p:cxnSp>
+      <p:cxnSp>
+        <p:nvCxnSpPr>
+          <p:cNvPr id="56" name="直線コネクタ 55">
+            <a:extLst>
+              <a:ext uri="{FF2B5EF4-FFF2-40B4-BE49-F238E27FC236}">
+                <a16:creationId xmlns:a16="http://schemas.microsoft.com/office/drawing/2014/main" id="{4A1EE3B3-D37E-4045-A964-E0F94D402FCA}"/>
+              </a:ext>
+            </a:extLst>
+          </p:cNvPr>
+          <p:cNvCxnSpPr>
+            <a:cxnSpLocks/>
+          </p:cNvCxnSpPr>
+          <p:nvPr/>
+        </p:nvCxnSpPr>
+        <p:spPr>
+          <a:xfrm>
+            <a:off x="9531673" y="4517072"/>
+            <a:ext cx="273399" cy="385872"/>
+          </a:xfrm>
+          <a:prstGeom prst="line">
+            <a:avLst/>
+          </a:prstGeom>
+          <a:ln>
+            <a:solidFill>
+              <a:schemeClr val="tx1"/>
+            </a:solidFill>
+            <a:headEnd type="none" w="med" len="med"/>
+            <a:tailEnd type="arrow" w="med" len="med"/>
+          </a:ln>
+        </p:spPr>
+        <p:style>
+          <a:lnRef idx="1">
+            <a:schemeClr val="accent1"/>
+          </a:lnRef>
+          <a:fillRef idx="0">
+            <a:schemeClr val="accent1"/>
+          </a:fillRef>
+          <a:effectRef idx="0">
+            <a:schemeClr val="accent1"/>
+          </a:effectRef>
+          <a:fontRef idx="minor">
+            <a:schemeClr val="tx1"/>
+          </a:fontRef>
+        </p:style>
+      </p:cxnSp>
+      <p:sp>
+        <p:nvSpPr>
+          <p:cNvPr id="57" name="正方形/長方形 56">
+            <a:extLst>
+              <a:ext uri="{FF2B5EF4-FFF2-40B4-BE49-F238E27FC236}">
+                <a16:creationId xmlns:a16="http://schemas.microsoft.com/office/drawing/2014/main" id="{8BE183E3-2565-4A44-AC48-F3AF611FAFC8}"/>
+              </a:ext>
+            </a:extLst>
+          </p:cNvPr>
+          <p:cNvSpPr/>
+          <p:nvPr/>
+        </p:nvSpPr>
+        <p:spPr>
+          <a:xfrm>
+            <a:off x="947867" y="6033999"/>
+            <a:ext cx="1471709" cy="367023"/>
+          </a:xfrm>
+          <a:prstGeom prst="rect">
+            <a:avLst/>
+          </a:prstGeom>
+          <a:noFill/>
+          <a:ln w="28575">
+            <a:solidFill>
+              <a:schemeClr val="tx1"/>
+            </a:solidFill>
+          </a:ln>
+        </p:spPr>
+        <p:style>
+          <a:lnRef idx="2">
+            <a:schemeClr val="accent1">
+              <a:shade val="50000"/>
+            </a:schemeClr>
+          </a:lnRef>
+          <a:fillRef idx="1">
+            <a:schemeClr val="accent1"/>
+          </a:fillRef>
+          <a:effectRef idx="0">
+            <a:schemeClr val="accent1"/>
+          </a:effectRef>
+          <a:fontRef idx="minor">
+            <a:schemeClr val="lt1"/>
+          </a:fontRef>
+        </p:style>
+        <p:txBody>
+          <a:bodyPr rtlCol="0" anchor="ctr"/>
+          <a:lstStyle/>
+          <a:p>
+            <a:pPr algn="r"/>
+            <a:endParaRPr kumimoji="1" lang="ja-JP" altLang="en-US"/>
+          </a:p>
+        </p:txBody>
+      </p:sp>
+      <p:cxnSp>
+        <p:nvCxnSpPr>
+          <p:cNvPr id="58" name="直線コネクタ 57">
+            <a:extLst>
+              <a:ext uri="{FF2B5EF4-FFF2-40B4-BE49-F238E27FC236}">
+                <a16:creationId xmlns:a16="http://schemas.microsoft.com/office/drawing/2014/main" id="{1ED56542-FB30-CA46-A5FC-7427D124E9C4}"/>
+              </a:ext>
+            </a:extLst>
+          </p:cNvPr>
+          <p:cNvCxnSpPr>
+            <a:cxnSpLocks/>
+          </p:cNvCxnSpPr>
+          <p:nvPr/>
+        </p:nvCxnSpPr>
+        <p:spPr>
+          <a:xfrm flipH="1" flipV="1">
+            <a:off x="947867" y="6569531"/>
+            <a:ext cx="1471710" cy="1"/>
+          </a:xfrm>
+          <a:prstGeom prst="line">
+            <a:avLst/>
+          </a:prstGeom>
+          <a:ln>
+            <a:solidFill>
+              <a:schemeClr val="tx1"/>
+            </a:solidFill>
+            <a:headEnd type="arrow" w="med" len="med"/>
+            <a:tailEnd type="arrow" w="med" len="med"/>
+          </a:ln>
+        </p:spPr>
+        <p:style>
+          <a:lnRef idx="1">
+            <a:schemeClr val="accent1"/>
+          </a:lnRef>
+          <a:fillRef idx="0">
+            <a:schemeClr val="accent1"/>
+          </a:fillRef>
+          <a:effectRef idx="0">
+            <a:schemeClr val="accent1"/>
+          </a:effectRef>
+          <a:fontRef idx="minor">
+            <a:schemeClr val="tx1"/>
+          </a:fontRef>
+        </p:style>
+      </p:cxnSp>
+      <p:sp>
+        <p:nvSpPr>
+          <p:cNvPr id="59" name="テキスト ボックス 58">
+            <a:extLst>
+              <a:ext uri="{FF2B5EF4-FFF2-40B4-BE49-F238E27FC236}">
+                <a16:creationId xmlns:a16="http://schemas.microsoft.com/office/drawing/2014/main" id="{01CE8E2D-8DD3-9547-A1FC-4DC5AE1D218D}"/>
+              </a:ext>
+            </a:extLst>
+          </p:cNvPr>
+          <p:cNvSpPr txBox="1"/>
+          <p:nvPr/>
+        </p:nvSpPr>
+        <p:spPr>
+          <a:xfrm>
+            <a:off x="2786789" y="5665381"/>
+            <a:ext cx="596638" cy="307777"/>
+          </a:xfrm>
+          <a:prstGeom prst="rect">
+            <a:avLst/>
+          </a:prstGeom>
+          <a:noFill/>
+        </p:spPr>
+        <p:txBody>
+          <a:bodyPr wrap="none" rtlCol="0">
+            <a:spAutoFit/>
+          </a:bodyPr>
+          <a:lstStyle/>
+          <a:p>
+            <a:r>
+              <a:rPr kumimoji="1" lang="en-US" altLang="ja-JP" sz="1400" dirty="0"/>
+              <a:t>large</a:t>
+            </a:r>
+            <a:endParaRPr kumimoji="1" lang="ja-JP" altLang="en-US" sz="1400"/>
+          </a:p>
+        </p:txBody>
+      </p:sp>
+      <p:sp>
+        <p:nvSpPr>
+          <p:cNvPr id="61" name="正方形/長方形 60">
+            <a:extLst>
+              <a:ext uri="{FF2B5EF4-FFF2-40B4-BE49-F238E27FC236}">
+                <a16:creationId xmlns:a16="http://schemas.microsoft.com/office/drawing/2014/main" id="{12058BEA-7497-C34D-8481-A1F46B26DFAF}"/>
+              </a:ext>
+            </a:extLst>
+          </p:cNvPr>
+          <p:cNvSpPr/>
+          <p:nvPr/>
+        </p:nvSpPr>
+        <p:spPr>
+          <a:xfrm>
+            <a:off x="5103110" y="6032499"/>
+            <a:ext cx="617988" cy="367023"/>
+          </a:xfrm>
+          <a:prstGeom prst="rect">
+            <a:avLst/>
+          </a:prstGeom>
+          <a:noFill/>
+          <a:ln w="28575">
+            <a:solidFill>
+              <a:schemeClr val="tx1"/>
+            </a:solidFill>
+          </a:ln>
+        </p:spPr>
+        <p:style>
+          <a:lnRef idx="2">
+            <a:schemeClr val="accent1">
+              <a:shade val="50000"/>
+            </a:schemeClr>
+          </a:lnRef>
+          <a:fillRef idx="1">
+            <a:schemeClr val="accent1"/>
+          </a:fillRef>
+          <a:effectRef idx="0">
+            <a:schemeClr val="accent1"/>
+          </a:effectRef>
+          <a:fontRef idx="minor">
+            <a:schemeClr val="lt1"/>
+          </a:fontRef>
+        </p:style>
+        <p:txBody>
+          <a:bodyPr rtlCol="0" anchor="ctr"/>
+          <a:lstStyle/>
+          <a:p>
+            <a:pPr algn="r"/>
+            <a:endParaRPr kumimoji="1" lang="ja-JP" altLang="en-US"/>
+          </a:p>
+        </p:txBody>
+      </p:sp>
+      <p:cxnSp>
+        <p:nvCxnSpPr>
+          <p:cNvPr id="63" name="直線コネクタ 62">
+            <a:extLst>
+              <a:ext uri="{FF2B5EF4-FFF2-40B4-BE49-F238E27FC236}">
+                <a16:creationId xmlns:a16="http://schemas.microsoft.com/office/drawing/2014/main" id="{77E33F9F-9D90-524E-A102-158E93AA9A12}"/>
+              </a:ext>
+            </a:extLst>
+          </p:cNvPr>
+          <p:cNvCxnSpPr>
+            <a:cxnSpLocks/>
+          </p:cNvCxnSpPr>
+          <p:nvPr/>
+        </p:nvCxnSpPr>
+        <p:spPr>
+          <a:xfrm flipH="1" flipV="1">
+            <a:off x="2537915" y="6213359"/>
+            <a:ext cx="777146" cy="1"/>
+          </a:xfrm>
+          <a:prstGeom prst="line">
+            <a:avLst/>
+          </a:prstGeom>
+          <a:ln w="12700">
+            <a:solidFill>
+              <a:schemeClr val="tx1"/>
+            </a:solidFill>
+            <a:prstDash val="dash"/>
+            <a:headEnd type="none" w="med" len="med"/>
+            <a:tailEnd type="none" w="med" len="med"/>
+          </a:ln>
+        </p:spPr>
+        <p:style>
+          <a:lnRef idx="1">
+            <a:schemeClr val="accent1"/>
+          </a:lnRef>
+          <a:fillRef idx="0">
+            <a:schemeClr val="accent1"/>
+          </a:fillRef>
+          <a:effectRef idx="0">
+            <a:schemeClr val="accent1"/>
+          </a:effectRef>
+          <a:fontRef idx="minor">
+            <a:schemeClr val="tx1"/>
+          </a:fontRef>
+        </p:style>
+      </p:cxnSp>
+      <p:sp>
+        <p:nvSpPr>
+          <p:cNvPr id="65" name="テキスト ボックス 64">
+            <a:extLst>
+              <a:ext uri="{FF2B5EF4-FFF2-40B4-BE49-F238E27FC236}">
+                <a16:creationId xmlns:a16="http://schemas.microsoft.com/office/drawing/2014/main" id="{B1AC98FA-E454-0443-B118-4853D63F8E5C}"/>
+              </a:ext>
+            </a:extLst>
+          </p:cNvPr>
+          <p:cNvSpPr txBox="1"/>
+          <p:nvPr/>
+        </p:nvSpPr>
+        <p:spPr>
+          <a:xfrm>
+            <a:off x="5083876" y="6471098"/>
+            <a:ext cx="867545" cy="307777"/>
+          </a:xfrm>
+          <a:prstGeom prst="rect">
+            <a:avLst/>
+          </a:prstGeom>
+          <a:noFill/>
+        </p:spPr>
+        <p:txBody>
+          <a:bodyPr wrap="none" rtlCol="0">
+            <a:spAutoFit/>
+          </a:bodyPr>
+          <a:lstStyle/>
+          <a:p>
+            <a:r>
+              <a:rPr kumimoji="1" lang="en-US" altLang="ja-JP" sz="1400" dirty="0"/>
+              <a:t>Fraction</a:t>
+            </a:r>
+            <a:endParaRPr kumimoji="1" lang="ja-JP" altLang="en-US" sz="1400"/>
+          </a:p>
+        </p:txBody>
+      </p:sp>
+      <p:sp>
+        <p:nvSpPr>
+          <p:cNvPr id="66" name="テキスト ボックス 65">
+            <a:extLst>
+              <a:ext uri="{FF2B5EF4-FFF2-40B4-BE49-F238E27FC236}">
+                <a16:creationId xmlns:a16="http://schemas.microsoft.com/office/drawing/2014/main" id="{82998430-F8E8-8047-B41F-D4439E42BAC2}"/>
+              </a:ext>
+            </a:extLst>
+          </p:cNvPr>
+          <p:cNvSpPr txBox="1"/>
+          <p:nvPr/>
+        </p:nvSpPr>
+        <p:spPr>
+          <a:xfrm>
+            <a:off x="1072015" y="6599074"/>
+            <a:ext cx="1223412" cy="307777"/>
+          </a:xfrm>
+          <a:prstGeom prst="rect">
+            <a:avLst/>
+          </a:prstGeom>
+          <a:noFill/>
+        </p:spPr>
+        <p:txBody>
+          <a:bodyPr wrap="none" rtlCol="0">
+            <a:spAutoFit/>
+          </a:bodyPr>
+          <a:lstStyle/>
+          <a:p>
+            <a:r>
+              <a:rPr kumimoji="1" lang="en-US" altLang="ja-JP" sz="1400" dirty="0"/>
+              <a:t>Max rec size</a:t>
+            </a:r>
+            <a:endParaRPr kumimoji="1" lang="ja-JP" altLang="en-US" sz="1400"/>
+          </a:p>
+        </p:txBody>
+      </p:sp>
+      <p:sp>
+        <p:nvSpPr>
+          <p:cNvPr id="67" name="テキスト ボックス 66">
+            <a:extLst>
+              <a:ext uri="{FF2B5EF4-FFF2-40B4-BE49-F238E27FC236}">
+                <a16:creationId xmlns:a16="http://schemas.microsoft.com/office/drawing/2014/main" id="{9CAFCB96-37B7-5B48-A717-73CDE83DC837}"/>
+              </a:ext>
+            </a:extLst>
+          </p:cNvPr>
+          <p:cNvSpPr txBox="1"/>
+          <p:nvPr/>
+        </p:nvSpPr>
+        <p:spPr>
+          <a:xfrm>
+            <a:off x="3603527" y="6595583"/>
+            <a:ext cx="1223412" cy="307777"/>
+          </a:xfrm>
+          <a:prstGeom prst="rect">
+            <a:avLst/>
+          </a:prstGeom>
+          <a:noFill/>
+        </p:spPr>
+        <p:txBody>
+          <a:bodyPr wrap="none" rtlCol="0">
+            <a:spAutoFit/>
+          </a:bodyPr>
+          <a:lstStyle/>
+          <a:p>
+            <a:r>
+              <a:rPr kumimoji="1" lang="en-US" altLang="ja-JP" sz="1400" dirty="0"/>
+              <a:t>Max rec size</a:t>
+            </a:r>
+            <a:endParaRPr kumimoji="1" lang="ja-JP" altLang="en-US" sz="1400"/>
+          </a:p>
+        </p:txBody>
+      </p:sp>
+      <p:cxnSp>
+        <p:nvCxnSpPr>
+          <p:cNvPr id="69" name="直線コネクタ 68">
+            <a:extLst>
+              <a:ext uri="{FF2B5EF4-FFF2-40B4-BE49-F238E27FC236}">
+                <a16:creationId xmlns:a16="http://schemas.microsoft.com/office/drawing/2014/main" id="{DC6584FD-3187-3442-9C2F-29232D93B965}"/>
+              </a:ext>
+            </a:extLst>
+          </p:cNvPr>
+          <p:cNvCxnSpPr>
+            <a:cxnSpLocks/>
+          </p:cNvCxnSpPr>
+          <p:nvPr/>
+        </p:nvCxnSpPr>
+        <p:spPr>
+          <a:xfrm flipH="1">
+            <a:off x="947867" y="5900665"/>
+            <a:ext cx="4773231" cy="1"/>
+          </a:xfrm>
+          <a:prstGeom prst="line">
+            <a:avLst/>
+          </a:prstGeom>
+          <a:ln w="12700">
+            <a:solidFill>
+              <a:schemeClr val="tx1"/>
+            </a:solidFill>
+            <a:prstDash val="dash"/>
+            <a:headEnd type="arrow" w="med" len="med"/>
+            <a:tailEnd type="arrow" w="med" len="med"/>
+          </a:ln>
+        </p:spPr>
+        <p:style>
+          <a:lnRef idx="1">
+            <a:schemeClr val="accent1"/>
+          </a:lnRef>
+          <a:fillRef idx="0">
+            <a:schemeClr val="accent1"/>
+          </a:fillRef>
+          <a:effectRef idx="0">
+            <a:schemeClr val="accent1"/>
+          </a:effectRef>
+          <a:fontRef idx="minor">
+            <a:schemeClr val="tx1"/>
+          </a:fontRef>
+        </p:style>
+      </p:cxnSp>
+      <p:cxnSp>
+        <p:nvCxnSpPr>
+          <p:cNvPr id="71" name="直線コネクタ 70">
+            <a:extLst>
+              <a:ext uri="{FF2B5EF4-FFF2-40B4-BE49-F238E27FC236}">
+                <a16:creationId xmlns:a16="http://schemas.microsoft.com/office/drawing/2014/main" id="{D9D005DE-41FA-C146-B77D-896979DF7622}"/>
+              </a:ext>
+            </a:extLst>
+          </p:cNvPr>
+          <p:cNvCxnSpPr>
+            <a:cxnSpLocks/>
+          </p:cNvCxnSpPr>
+          <p:nvPr/>
+        </p:nvCxnSpPr>
+        <p:spPr>
+          <a:xfrm flipH="1" flipV="1">
+            <a:off x="8709494" y="5182609"/>
+            <a:ext cx="1" cy="851390"/>
+          </a:xfrm>
+          <a:prstGeom prst="line">
+            <a:avLst/>
+          </a:prstGeom>
+          <a:ln>
+            <a:solidFill>
+              <a:schemeClr val="tx1"/>
+            </a:solidFill>
+            <a:headEnd type="none" w="med" len="med"/>
+            <a:tailEnd type="arrow" w="med" len="med"/>
+          </a:ln>
+        </p:spPr>
+        <p:style>
+          <a:lnRef idx="1">
+            <a:schemeClr val="accent1"/>
+          </a:lnRef>
+          <a:fillRef idx="0">
+            <a:schemeClr val="accent1"/>
+          </a:fillRef>
+          <a:effectRef idx="0">
+            <a:schemeClr val="accent1"/>
+          </a:effectRef>
+          <a:fontRef idx="minor">
+            <a:schemeClr val="tx1"/>
+          </a:fontRef>
+        </p:style>
+      </p:cxnSp>
+      <p:cxnSp>
+        <p:nvCxnSpPr>
+          <p:cNvPr id="72" name="直線コネクタ 71">
+            <a:extLst>
+              <a:ext uri="{FF2B5EF4-FFF2-40B4-BE49-F238E27FC236}">
+                <a16:creationId xmlns:a16="http://schemas.microsoft.com/office/drawing/2014/main" id="{27C220C0-78AB-6E4C-96D8-EA121FCF540E}"/>
+              </a:ext>
+            </a:extLst>
+          </p:cNvPr>
+          <p:cNvCxnSpPr>
+            <a:cxnSpLocks/>
+          </p:cNvCxnSpPr>
+          <p:nvPr/>
+        </p:nvCxnSpPr>
+        <p:spPr>
+          <a:xfrm flipH="1" flipV="1">
+            <a:off x="8893423" y="5208074"/>
+            <a:ext cx="1" cy="851390"/>
+          </a:xfrm>
+          <a:prstGeom prst="line">
+            <a:avLst/>
+          </a:prstGeom>
+          <a:ln>
+            <a:solidFill>
+              <a:schemeClr val="tx1"/>
+            </a:solidFill>
+            <a:headEnd type="none" w="med" len="med"/>
+            <a:tailEnd type="arrow" w="med" len="med"/>
+          </a:ln>
+        </p:spPr>
+        <p:style>
+          <a:lnRef idx="1">
+            <a:schemeClr val="accent1"/>
+          </a:lnRef>
+          <a:fillRef idx="0">
+            <a:schemeClr val="accent1"/>
+          </a:fillRef>
+          <a:effectRef idx="0">
+            <a:schemeClr val="accent1"/>
+          </a:effectRef>
+          <a:fontRef idx="minor">
+            <a:schemeClr val="tx1"/>
+          </a:fontRef>
+        </p:style>
+      </p:cxnSp>
+      <p:sp>
+        <p:nvSpPr>
+          <p:cNvPr id="73" name="テキスト ボックス 72">
+            <a:extLst>
+              <a:ext uri="{FF2B5EF4-FFF2-40B4-BE49-F238E27FC236}">
+                <a16:creationId xmlns:a16="http://schemas.microsoft.com/office/drawing/2014/main" id="{EF961907-DD18-BF41-8598-3752304C2C58}"/>
+              </a:ext>
+            </a:extLst>
+          </p:cNvPr>
+          <p:cNvSpPr txBox="1"/>
+          <p:nvPr/>
+        </p:nvSpPr>
+        <p:spPr>
+          <a:xfrm>
+            <a:off x="4084308" y="5483734"/>
+            <a:ext cx="2967479" cy="307777"/>
+          </a:xfrm>
+          <a:prstGeom prst="rect">
+            <a:avLst/>
+          </a:prstGeom>
+          <a:noFill/>
+        </p:spPr>
+        <p:txBody>
+          <a:bodyPr wrap="none" rtlCol="0">
+            <a:spAutoFit/>
+          </a:bodyPr>
+          <a:lstStyle/>
+          <a:p>
+            <a:r>
+              <a:rPr kumimoji="1" lang="en-US" altLang="ja-JP" sz="1400" dirty="0"/>
+              <a:t>1</a:t>
+            </a:r>
+            <a:r>
+              <a:rPr kumimoji="1" lang="ja-JP" altLang="en-US" sz="1400"/>
+              <a:t>回の</a:t>
+            </a:r>
+            <a:r>
+              <a:rPr kumimoji="1" lang="en-US" altLang="ja-JP" sz="1400" dirty="0" err="1"/>
+              <a:t>SSL_wirte</a:t>
+            </a:r>
+            <a:r>
+              <a:rPr kumimoji="1" lang="en-US" altLang="ja-JP" sz="1400" dirty="0"/>
+              <a:t> </a:t>
+            </a:r>
+            <a:r>
+              <a:rPr kumimoji="1" lang="ja-JP" altLang="en-US" sz="1400"/>
+              <a:t>で複数のレコード</a:t>
+            </a:r>
+            <a:endParaRPr kumimoji="1" lang="en-US" altLang="ja-JP" sz="1400" dirty="0"/>
+          </a:p>
+        </p:txBody>
+      </p:sp>
+      <p:sp>
+        <p:nvSpPr>
+          <p:cNvPr id="74" name="テキスト ボックス 73">
+            <a:extLst>
+              <a:ext uri="{FF2B5EF4-FFF2-40B4-BE49-F238E27FC236}">
+                <a16:creationId xmlns:a16="http://schemas.microsoft.com/office/drawing/2014/main" id="{A57381CA-2D48-9E4C-8D6E-28D325687876}"/>
+              </a:ext>
+            </a:extLst>
+          </p:cNvPr>
+          <p:cNvSpPr txBox="1"/>
+          <p:nvPr/>
+        </p:nvSpPr>
+        <p:spPr>
+          <a:xfrm>
+            <a:off x="8867019" y="5541412"/>
+            <a:ext cx="2513830" cy="307777"/>
+          </a:xfrm>
+          <a:prstGeom prst="rect">
+            <a:avLst/>
+          </a:prstGeom>
+          <a:noFill/>
+        </p:spPr>
+        <p:txBody>
+          <a:bodyPr wrap="none" rtlCol="0">
+            <a:spAutoFit/>
+          </a:bodyPr>
+          <a:lstStyle/>
+          <a:p>
+            <a:r>
+              <a:rPr kumimoji="1" lang="en-US" altLang="ja-JP" sz="1400" dirty="0"/>
+              <a:t>1</a:t>
+            </a:r>
+            <a:r>
+              <a:rPr kumimoji="1" lang="ja-JP" altLang="en-US" sz="1400"/>
+              <a:t>回の</a:t>
+            </a:r>
+            <a:r>
+              <a:rPr kumimoji="1" lang="en-US" altLang="ja-JP" sz="1400" dirty="0" err="1"/>
+              <a:t>SSL_read</a:t>
+            </a:r>
+            <a:r>
+              <a:rPr kumimoji="1" lang="ja-JP" altLang="en-US" sz="1400"/>
+              <a:t>で１レコード</a:t>
+            </a:r>
+            <a:endParaRPr kumimoji="1" lang="en-US" altLang="ja-JP" sz="1400" dirty="0"/>
+          </a:p>
+        </p:txBody>
+      </p:sp>
+      <p:sp>
+        <p:nvSpPr>
+          <p:cNvPr id="76" name="円弧 75">
+            <a:extLst>
+              <a:ext uri="{FF2B5EF4-FFF2-40B4-BE49-F238E27FC236}">
+                <a16:creationId xmlns:a16="http://schemas.microsoft.com/office/drawing/2014/main" id="{7CB20B64-B26C-2940-AA19-7CBC51824E49}"/>
+              </a:ext>
+            </a:extLst>
+          </p:cNvPr>
+          <p:cNvSpPr/>
+          <p:nvPr/>
+        </p:nvSpPr>
+        <p:spPr>
+          <a:xfrm flipV="1">
+            <a:off x="10051111" y="4854002"/>
+            <a:ext cx="226142" cy="490497"/>
+          </a:xfrm>
+          <a:prstGeom prst="arc">
+            <a:avLst>
+              <a:gd name="adj1" fmla="val 13601338"/>
+              <a:gd name="adj2" fmla="val 7039140"/>
+            </a:avLst>
+          </a:prstGeom>
+          <a:ln>
+            <a:solidFill>
+              <a:schemeClr val="tx1"/>
+            </a:solidFill>
+            <a:headEnd type="none" w="med" len="med"/>
+            <a:tailEnd type="arrow" w="med" len="med"/>
+          </a:ln>
+        </p:spPr>
+        <p:style>
+          <a:lnRef idx="1">
+            <a:schemeClr val="accent1"/>
+          </a:lnRef>
+          <a:fillRef idx="0">
+            <a:schemeClr val="accent1"/>
+          </a:fillRef>
+          <a:effectRef idx="0">
+            <a:schemeClr val="accent1"/>
+          </a:effectRef>
+          <a:fontRef idx="minor">
+            <a:schemeClr val="tx1"/>
+          </a:fontRef>
+        </p:style>
+        <p:txBody>
+          <a:bodyPr rtlCol="0" anchor="ctr"/>
+          <a:lstStyle/>
+          <a:p>
+            <a:pPr algn="ctr"/>
+            <a:endParaRPr kumimoji="1" lang="ja-JP" altLang="en-US"/>
+          </a:p>
+        </p:txBody>
+      </p:sp>
+    </p:spTree>
+    <p:extLst>
+      <p:ext uri="{BB962C8B-B14F-4D97-AF65-F5344CB8AC3E}">
+        <p14:creationId xmlns:p14="http://schemas.microsoft.com/office/powerpoint/2010/main" val="1491672620"/>
+      </p:ext>
+    </p:extLst>
+  </p:cSld>
+  <p:clrMapOvr>
+    <a:masterClrMapping/>
+  </p:clrMapOvr>
+</p:sld>
+</file>
+
 <file path=ppt/theme/theme1.xml><?xml version="1.0" encoding="utf-8"?>
 <a:theme xmlns:a="http://schemas.openxmlformats.org/drawingml/2006/main" name="Office テーマ">
   <a:themeElements>
@@ -4582,4 +7294,299 @@
     </a:ext>
   </a:extLst>
 </a:theme>
+</file>
+
+<file path=ppt/theme/theme2.xml><?xml version="1.0" encoding="utf-8"?>
+<a:theme xmlns:a="http://schemas.openxmlformats.org/drawingml/2006/main" name="Office テーマ">
+  <a:themeElements>
+    <a:clrScheme name="Office">
+      <a:dk1>
+        <a:sysClr val="windowText" lastClr="000000"/>
+      </a:dk1>
+      <a:lt1>
+        <a:sysClr val="window" lastClr="FFFFFF"/>
+      </a:lt1>
+      <a:dk2>
+        <a:srgbClr val="44546A"/>
+      </a:dk2>
+      <a:lt2>
+        <a:srgbClr val="E7E6E6"/>
+      </a:lt2>
+      <a:accent1>
+        <a:srgbClr val="4472C4"/>
+      </a:accent1>
+      <a:accent2>
+        <a:srgbClr val="ED7D31"/>
+      </a:accent2>
+      <a:accent3>
+        <a:srgbClr val="A5A5A5"/>
+      </a:accent3>
+      <a:accent4>
+        <a:srgbClr val="FFC000"/>
+      </a:accent4>
+      <a:accent5>
+        <a:srgbClr val="5B9BD5"/>
+      </a:accent5>
+      <a:accent6>
+        <a:srgbClr val="70AD47"/>
+      </a:accent6>
+      <a:hlink>
+        <a:srgbClr val="0563C1"/>
+      </a:hlink>
+      <a:folHlink>
+        <a:srgbClr val="954F72"/>
+      </a:folHlink>
+    </a:clrScheme>
+    <a:fontScheme name="Office">
+      <a:majorFont>
+        <a:latin typeface="游ゴシック Light" panose="020F0302020204030204"/>
+        <a:ea typeface=""/>
+        <a:cs typeface=""/>
+        <a:font script="Jpan" typeface="游ゴシック Light"/>
+        <a:font script="Hang" typeface="맑은 고딕"/>
+        <a:font script="Hans" typeface="等线 Light"/>
+        <a:font script="Hant" typeface="新細明體"/>
+        <a:font script="Arab" typeface="Times New Roman"/>
+        <a:font script="Hebr" typeface="Times New Roman"/>
+        <a:font script="Thai" typeface="Angsana New"/>
+        <a:font script="Ethi" typeface="Nyala"/>
+        <a:font script="Beng" typeface="Vrinda"/>
+        <a:font script="Gujr" typeface="Shruti"/>
+        <a:font script="Khmr" typeface="MoolBoran"/>
+        <a:font script="Knda" typeface="Tunga"/>
+        <a:font script="Guru" typeface="Raavi"/>
+        <a:font script="Cans" typeface="Euphemia"/>
+        <a:font script="Cher" typeface="Plantagenet Cherokee"/>
+        <a:font script="Yiii" typeface="Microsoft Yi Baiti"/>
+        <a:font script="Tibt" typeface="Microsoft Himalaya"/>
+        <a:font script="Thaa" typeface="MV Boli"/>
+        <a:font script="Deva" typeface="Mangal"/>
+        <a:font script="Telu" typeface="Gautami"/>
+        <a:font script="Taml" typeface="Latha"/>
+        <a:font script="Syrc" typeface="Estrangelo Edessa"/>
+        <a:font script="Orya" typeface="Kalinga"/>
+        <a:font script="Mlym" typeface="Kartika"/>
+        <a:font script="Laoo" typeface="DokChampa"/>
+        <a:font script="Sinh" typeface="Iskoola Pota"/>
+        <a:font script="Mong" typeface="Mongolian Baiti"/>
+        <a:font script="Viet" typeface="Times New Roman"/>
+        <a:font script="Uigh" typeface="Microsoft Uighur"/>
+        <a:font script="Geor" typeface="Sylfaen"/>
+        <a:font script="Armn" typeface="Arial"/>
+        <a:font script="Bugi" typeface="Leelawadee UI"/>
+        <a:font script="Bopo" typeface="Microsoft JhengHei"/>
+        <a:font script="Java" typeface="Javanese Text"/>
+        <a:font script="Lisu" typeface="Segoe UI"/>
+        <a:font script="Mymr" typeface="Myanmar Text"/>
+        <a:font script="Nkoo" typeface="Ebrima"/>
+        <a:font script="Olck" typeface="Nirmala UI"/>
+        <a:font script="Osma" typeface="Ebrima"/>
+        <a:font script="Phag" typeface="Phagspa"/>
+        <a:font script="Syrn" typeface="Estrangelo Edessa"/>
+        <a:font script="Syrj" typeface="Estrangelo Edessa"/>
+        <a:font script="Syre" typeface="Estrangelo Edessa"/>
+        <a:font script="Sora" typeface="Nirmala UI"/>
+        <a:font script="Tale" typeface="Microsoft Tai Le"/>
+        <a:font script="Talu" typeface="Microsoft New Tai Lue"/>
+        <a:font script="Tfng" typeface="Ebrima"/>
+      </a:majorFont>
+      <a:minorFont>
+        <a:latin typeface="游ゴシック" panose="020F0502020204030204"/>
+        <a:ea typeface=""/>
+        <a:cs typeface=""/>
+        <a:font script="Jpan" typeface="游ゴシック"/>
+        <a:font script="Hang" typeface="맑은 고딕"/>
+        <a:font script="Hans" typeface="等线"/>
+        <a:font script="Hant" typeface="新細明體"/>
+        <a:font script="Arab" typeface="Arial"/>
+        <a:font script="Hebr" typeface="Arial"/>
+        <a:font script="Thai" typeface="Cordia New"/>
+        <a:font script="Ethi" typeface="Nyala"/>
+        <a:font script="Beng" typeface="Vrinda"/>
+        <a:font script="Gujr" typeface="Shruti"/>
+        <a:font script="Khmr" typeface="DaunPenh"/>
+        <a:font script="Knda" typeface="Tunga"/>
+        <a:font script="Guru" typeface="Raavi"/>
+        <a:font script="Cans" typeface="Euphemia"/>
+        <a:font script="Cher" typeface="Plantagenet Cherokee"/>
+        <a:font script="Yiii" typeface="Microsoft Yi Baiti"/>
+        <a:font script="Tibt" typeface="Microsoft Himalaya"/>
+        <a:font script="Thaa" typeface="MV Boli"/>
+        <a:font script="Deva" typeface="Mangal"/>
+        <a:font script="Telu" typeface="Gautami"/>
+        <a:font script="Taml" typeface="Latha"/>
+        <a:font script="Syrc" typeface="Estrangelo Edessa"/>
+        <a:font script="Orya" typeface="Kalinga"/>
+        <a:font script="Mlym" typeface="Kartika"/>
+        <a:font script="Laoo" typeface="DokChampa"/>
+        <a:font script="Sinh" typeface="Iskoola Pota"/>
+        <a:font script="Mong" typeface="Mongolian Baiti"/>
+        <a:font script="Viet" typeface="Arial"/>
+        <a:font script="Uigh" typeface="Microsoft Uighur"/>
+        <a:font script="Geor" typeface="Sylfaen"/>
+        <a:font script="Armn" typeface="Arial"/>
+        <a:font script="Bugi" typeface="Leelawadee UI"/>
+        <a:font script="Bopo" typeface="Microsoft JhengHei"/>
+        <a:font script="Java" typeface="Javanese Text"/>
+        <a:font script="Lisu" typeface="Segoe UI"/>
+        <a:font script="Mymr" typeface="Myanmar Text"/>
+        <a:font script="Nkoo" typeface="Ebrima"/>
+        <a:font script="Olck" typeface="Nirmala UI"/>
+        <a:font script="Osma" typeface="Ebrima"/>
+        <a:font script="Phag" typeface="Phagspa"/>
+        <a:font script="Syrn" typeface="Estrangelo Edessa"/>
+        <a:font script="Syrj" typeface="Estrangelo Edessa"/>
+        <a:font script="Syre" typeface="Estrangelo Edessa"/>
+        <a:font script="Sora" typeface="Nirmala UI"/>
+        <a:font script="Tale" typeface="Microsoft Tai Le"/>
+        <a:font script="Talu" typeface="Microsoft New Tai Lue"/>
+        <a:font script="Tfng" typeface="Ebrima"/>
+      </a:minorFont>
+    </a:fontScheme>
+    <a:fmtScheme name="Office">
+      <a:fillStyleLst>
+        <a:solidFill>
+          <a:schemeClr val="phClr"/>
+        </a:solidFill>
+        <a:gradFill rotWithShape="1">
+          <a:gsLst>
+            <a:gs pos="0">
+              <a:schemeClr val="phClr">
+                <a:lumMod val="110000"/>
+                <a:satMod val="105000"/>
+                <a:tint val="67000"/>
+              </a:schemeClr>
+            </a:gs>
+            <a:gs pos="50000">
+              <a:schemeClr val="phClr">
+                <a:lumMod val="105000"/>
+                <a:satMod val="103000"/>
+                <a:tint val="73000"/>
+              </a:schemeClr>
+            </a:gs>
+            <a:gs pos="100000">
+              <a:schemeClr val="phClr">
+                <a:lumMod val="105000"/>
+                <a:satMod val="109000"/>
+                <a:tint val="81000"/>
+              </a:schemeClr>
+            </a:gs>
+          </a:gsLst>
+          <a:lin ang="5400000" scaled="0"/>
+        </a:gradFill>
+        <a:gradFill rotWithShape="1">
+          <a:gsLst>
+            <a:gs pos="0">
+              <a:schemeClr val="phClr">
+                <a:satMod val="103000"/>
+                <a:lumMod val="102000"/>
+                <a:tint val="94000"/>
+              </a:schemeClr>
+            </a:gs>
+            <a:gs pos="50000">
+              <a:schemeClr val="phClr">
+                <a:satMod val="110000"/>
+                <a:lumMod val="100000"/>
+                <a:shade val="100000"/>
+              </a:schemeClr>
+            </a:gs>
+            <a:gs pos="100000">
+              <a:schemeClr val="phClr">
+                <a:lumMod val="99000"/>
+                <a:satMod val="120000"/>
+                <a:shade val="78000"/>
+              </a:schemeClr>
+            </a:gs>
+          </a:gsLst>
+          <a:lin ang="5400000" scaled="0"/>
+        </a:gradFill>
+      </a:fillStyleLst>
+      <a:lnStyleLst>
+        <a:ln w="6350" cap="flat" cmpd="sng" algn="ctr">
+          <a:solidFill>
+            <a:schemeClr val="phClr"/>
+          </a:solidFill>
+          <a:prstDash val="solid"/>
+          <a:miter lim="800000"/>
+        </a:ln>
+        <a:ln w="12700" cap="flat" cmpd="sng" algn="ctr">
+          <a:solidFill>
+            <a:schemeClr val="phClr"/>
+          </a:solidFill>
+          <a:prstDash val="solid"/>
+          <a:miter lim="800000"/>
+        </a:ln>
+        <a:ln w="19050" cap="flat" cmpd="sng" algn="ctr">
+          <a:solidFill>
+            <a:schemeClr val="phClr"/>
+          </a:solidFill>
+          <a:prstDash val="solid"/>
+          <a:miter lim="800000"/>
+        </a:ln>
+      </a:lnStyleLst>
+      <a:effectStyleLst>
+        <a:effectStyle>
+          <a:effectLst/>
+        </a:effectStyle>
+        <a:effectStyle>
+          <a:effectLst/>
+        </a:effectStyle>
+        <a:effectStyle>
+          <a:effectLst>
+            <a:outerShdw blurRad="57150" dist="19050" dir="5400000" algn="ctr" rotWithShape="0">
+              <a:srgbClr val="000000">
+                <a:alpha val="63000"/>
+              </a:srgbClr>
+            </a:outerShdw>
+          </a:effectLst>
+        </a:effectStyle>
+      </a:effectStyleLst>
+      <a:bgFillStyleLst>
+        <a:solidFill>
+          <a:schemeClr val="phClr"/>
+        </a:solidFill>
+        <a:solidFill>
+          <a:schemeClr val="phClr">
+            <a:tint val="95000"/>
+            <a:satMod val="170000"/>
+          </a:schemeClr>
+        </a:solidFill>
+        <a:gradFill rotWithShape="1">
+          <a:gsLst>
+            <a:gs pos="0">
+              <a:schemeClr val="phClr">
+                <a:tint val="93000"/>
+                <a:satMod val="150000"/>
+                <a:shade val="98000"/>
+                <a:lumMod val="102000"/>
+              </a:schemeClr>
+            </a:gs>
+            <a:gs pos="50000">
+              <a:schemeClr val="phClr">
+                <a:tint val="98000"/>
+                <a:satMod val="130000"/>
+                <a:shade val="90000"/>
+                <a:lumMod val="103000"/>
+              </a:schemeClr>
+            </a:gs>
+            <a:gs pos="100000">
+              <a:schemeClr val="phClr">
+                <a:shade val="63000"/>
+                <a:satMod val="120000"/>
+              </a:schemeClr>
+            </a:gs>
+          </a:gsLst>
+          <a:lin ang="5400000" scaled="0"/>
+        </a:gradFill>
+      </a:bgFillStyleLst>
+    </a:fmtScheme>
+  </a:themeElements>
+  <a:objectDefaults/>
+  <a:extraClrSchemeLst/>
+  <a:extLst>
+    <a:ext uri="{05A4C25C-085E-4340-85A3-A5531E510DB2}">
+      <thm15:themeFamily xmlns:thm15="http://schemas.microsoft.com/office/thememl/2012/main" name="Office Theme" id="{62F939B6-93AF-4DB8-9C6B-D6C7DFDC589F}" vid="{4A3C46E8-61CC-4603-A589-7422A47A8E4A}"/>
+    </a:ext>
+  </a:extLst>
+</a:theme>
 </file>
</xml_diff>